<commit_message>
adding new files, that i guess i did not add before now?
</commit_message>
<xml_diff>
--- a/LA Data.pptx
+++ b/LA Data.pptx
@@ -18,6 +18,10 @@
     <p:sldId id="262" r:id="rId13"/>
     <p:sldId id="263" r:id="rId14"/>
     <p:sldId id="264" r:id="rId15"/>
+    <p:sldId id="265" r:id="rId16"/>
+    <p:sldId id="266" r:id="rId17"/>
+    <p:sldId id="267" r:id="rId18"/>
+    <p:sldId id="268" r:id="rId19"/>
   </p:sldIdLst>
   <p:sldSz cx="10080625" cy="5670550"/>
   <p:notesSz cx="7772400" cy="10058400"/>
@@ -682,7 +686,7 @@
         <p:txBody>
           <a:bodyPr/>
           <a:p>
-            <a:fld id="{6BB6409B-E29B-4ECC-B14D-823F82CBA788}" type="slidenum">
+            <a:fld id="{E049C223-5555-4907-8279-A8666C1596DC}" type="slidenum">
               <a:t>&lt;#&gt;</a:t>
             </a:fld>
           </a:p>
@@ -839,7 +843,7 @@
         <p:txBody>
           <a:bodyPr/>
           <a:p>
-            <a:fld id="{51CA4697-93A5-421C-8296-8D254269E406}" type="slidenum">
+            <a:fld id="{3C6450F6-569B-48DD-8499-3C9796B11E57}" type="slidenum">
               <a:t>&lt;#&gt;</a:t>
             </a:fld>
           </a:p>
@@ -993,7 +997,7 @@
         <p:txBody>
           <a:bodyPr/>
           <a:p>
-            <a:fld id="{9C123BB4-B146-4F33-BAD3-F76CBCA1BA8B}" type="slidenum">
+            <a:fld id="{DEBDD12D-871B-45E5-ACC6-AD62735D8AD1}" type="slidenum">
               <a:t>&lt;#&gt;</a:t>
             </a:fld>
           </a:p>
@@ -1181,7 +1185,7 @@
         <p:txBody>
           <a:bodyPr/>
           <a:p>
-            <a:fld id="{89183047-6D0A-40B6-8421-CBC68CAFF095}" type="slidenum">
+            <a:fld id="{A1AC51CD-1A55-4F94-8F33-D0728674650D}" type="slidenum">
               <a:t>&lt;#&gt;</a:t>
             </a:fld>
           </a:p>
@@ -1301,7 +1305,7 @@
         <p:txBody>
           <a:bodyPr/>
           <a:p>
-            <a:fld id="{DE558B30-F8BC-4276-A9B2-3FE54C7A2026}" type="slidenum">
+            <a:fld id="{7B18F0C1-DA9C-4CB2-BE21-113998E45B2D}" type="slidenum">
               <a:t>&lt;#&gt;</a:t>
             </a:fld>
           </a:p>
@@ -1421,7 +1425,7 @@
         <p:txBody>
           <a:bodyPr/>
           <a:p>
-            <a:fld id="{0E02D634-2660-48FB-BDEB-6FAB682A07A2}" type="slidenum">
+            <a:fld id="{6DE11BBF-94A3-43EA-AEAF-2254492E2C05}" type="slidenum">
               <a:t>&lt;#&gt;</a:t>
             </a:fld>
           </a:p>
@@ -1643,7 +1647,7 @@
         <p:txBody>
           <a:bodyPr/>
           <a:p>
-            <a:fld id="{E1836A86-9DD7-4F8F-9D83-DC9CC31F350D}" type="slidenum">
+            <a:fld id="{66944879-F2E4-46F0-9239-17DF60CB19BC}" type="slidenum">
               <a:t>&lt;#&gt;</a:t>
             </a:fld>
           </a:p>
@@ -1961,7 +1965,7 @@
         <p:txBody>
           <a:bodyPr/>
           <a:p>
-            <a:fld id="{3F11DB40-1E94-45EE-BC59-9AB00A517BF4}" type="slidenum">
+            <a:fld id="{EC10BB4D-E460-4321-842C-E4243F400443}" type="slidenum">
               <a:t>&lt;#&gt;</a:t>
             </a:fld>
           </a:p>
@@ -2183,7 +2187,7 @@
         <p:txBody>
           <a:bodyPr/>
           <a:p>
-            <a:fld id="{2AA82536-9E1A-46D9-90A4-50BCEDDB48AF}" type="slidenum">
+            <a:fld id="{AD0BF4DD-FAAE-4E42-B8A0-D51A9988046C}" type="slidenum">
               <a:t>&lt;#&gt;</a:t>
             </a:fld>
           </a:p>
@@ -2371,7 +2375,7 @@
         <p:txBody>
           <a:bodyPr/>
           <a:p>
-            <a:fld id="{5E4C7279-5CA1-445D-B04E-6A7EC9BBD309}" type="slidenum">
+            <a:fld id="{8C1C1377-1769-4178-A5D1-5E3A628C3EFC}" type="slidenum">
               <a:t>&lt;#&gt;</a:t>
             </a:fld>
           </a:p>
@@ -2627,7 +2631,7 @@
         <p:txBody>
           <a:bodyPr/>
           <a:p>
-            <a:fld id="{BC632FF3-5844-4EBA-9002-70C684740B27}" type="slidenum">
+            <a:fld id="{01B15137-82AB-4B07-A795-610FE68224C3}" type="slidenum">
               <a:t>&lt;#&gt;</a:t>
             </a:fld>
           </a:p>
@@ -2951,7 +2955,7 @@
         <p:txBody>
           <a:bodyPr/>
           <a:p>
-            <a:fld id="{84157955-AFBC-462C-B1E6-9FCC0F29EC23}" type="slidenum">
+            <a:fld id="{7F2D89A6-0409-435C-814D-C726549FC7A2}" type="slidenum">
               <a:t>&lt;#&gt;</a:t>
             </a:fld>
           </a:p>
@@ -3034,7 +3038,7 @@
         <p:txBody>
           <a:bodyPr/>
           <a:p>
-            <a:fld id="{CC3FB24A-F069-4F77-868E-752613F79370}" type="slidenum">
+            <a:fld id="{7D1A37ED-4D26-4E91-A324-9CE739EF6BF7}" type="slidenum">
               <a:t>&lt;#&gt;</a:t>
             </a:fld>
           </a:p>
@@ -3191,7 +3195,7 @@
         <p:txBody>
           <a:bodyPr/>
           <a:p>
-            <a:fld id="{7E95E5CB-3E1C-4898-AD0A-392380A37CC4}" type="slidenum">
+            <a:fld id="{7B38D2D9-D35C-4189-8999-72DFF94C1AF5}" type="slidenum">
               <a:t>&lt;#&gt;</a:t>
             </a:fld>
           </a:p>
@@ -3345,7 +3349,7 @@
         <p:txBody>
           <a:bodyPr/>
           <a:p>
-            <a:fld id="{10C0ABA6-7C07-44BC-8EDD-6463F78449A7}" type="slidenum">
+            <a:fld id="{4B81A1B6-D8E0-482D-B665-8AE280DD8736}" type="slidenum">
               <a:t>&lt;#&gt;</a:t>
             </a:fld>
           </a:p>
@@ -3533,7 +3537,7 @@
         <p:txBody>
           <a:bodyPr/>
           <a:p>
-            <a:fld id="{21E802B3-E360-4D36-AF6A-96294B59D200}" type="slidenum">
+            <a:fld id="{37AABA63-3D60-47C3-9C4B-09CD25830A8C}" type="slidenum">
               <a:t>&lt;#&gt;</a:t>
             </a:fld>
           </a:p>
@@ -3653,7 +3657,7 @@
         <p:txBody>
           <a:bodyPr/>
           <a:p>
-            <a:fld id="{04842CAD-0500-40E7-897F-EC31BF82C1F4}" type="slidenum">
+            <a:fld id="{E55EDAC8-5CBE-48E5-8DB7-D4E5BB237991}" type="slidenum">
               <a:t>&lt;#&gt;</a:t>
             </a:fld>
           </a:p>
@@ -3866,7 +3870,7 @@
         <p:txBody>
           <a:bodyPr/>
           <a:p>
-            <a:fld id="{A77C46E2-532C-4709-A7C3-B05B38DB2962}" type="slidenum">
+            <a:fld id="{6E874FA7-C2CC-42E2-9361-31986C52D635}" type="slidenum">
               <a:t>&lt;#&gt;</a:t>
             </a:fld>
           </a:p>
@@ -4088,7 +4092,7 @@
         <p:txBody>
           <a:bodyPr/>
           <a:p>
-            <a:fld id="{F8B6779D-FB0F-4149-A4BA-28FD87D57DB0}" type="slidenum">
+            <a:fld id="{F24EB04C-96BC-4CD2-9D05-82E6F84988BC}" type="slidenum">
               <a:t>&lt;#&gt;</a:t>
             </a:fld>
           </a:p>
@@ -4310,7 +4314,7 @@
         <p:txBody>
           <a:bodyPr/>
           <a:p>
-            <a:fld id="{29E346B1-352E-4E4A-B172-6BCD39E92DED}" type="slidenum">
+            <a:fld id="{09545B0D-BC8D-4CCC-847B-1DCB69493B27}" type="slidenum">
               <a:t>&lt;#&gt;</a:t>
             </a:fld>
           </a:p>
@@ -4532,7 +4536,7 @@
         <p:txBody>
           <a:bodyPr/>
           <a:p>
-            <a:fld id="{3E9B3120-3D3F-4C57-B1BA-6342718DAC11}" type="slidenum">
+            <a:fld id="{9E7DBD96-16A2-40ED-AC68-900526F8BCD3}" type="slidenum">
               <a:t>&lt;#&gt;</a:t>
             </a:fld>
           </a:p>
@@ -4720,7 +4724,7 @@
         <p:txBody>
           <a:bodyPr/>
           <a:p>
-            <a:fld id="{FC978801-5DFC-46A7-BFAA-C84FF6BC2709}" type="slidenum">
+            <a:fld id="{D5B84F58-7B21-4726-BE0F-EAEA69946E1C}" type="slidenum">
               <a:t>&lt;#&gt;</a:t>
             </a:fld>
           </a:p>
@@ -4976,7 +4980,7 @@
         <p:txBody>
           <a:bodyPr/>
           <a:p>
-            <a:fld id="{554D66EA-EC5F-4459-8FA0-5B110C793753}" type="slidenum">
+            <a:fld id="{49BD427F-2A5B-4595-B4B6-2E0AB4E2B23E}" type="slidenum">
               <a:t>&lt;#&gt;</a:t>
             </a:fld>
           </a:p>
@@ -5300,7 +5304,7 @@
         <p:txBody>
           <a:bodyPr/>
           <a:p>
-            <a:fld id="{CE6B241F-C3BD-4B4A-B7B5-6F08EED6DD3C}" type="slidenum">
+            <a:fld id="{B9FA689A-1F57-4C2D-BF72-7CA683742525}" type="slidenum">
               <a:t>&lt;#&gt;</a:t>
             </a:fld>
           </a:p>
@@ -5383,7 +5387,7 @@
         <p:txBody>
           <a:bodyPr/>
           <a:p>
-            <a:fld id="{D851D58A-5973-47D4-B8F2-5047F98542D2}" type="slidenum">
+            <a:fld id="{EA6D8016-B29B-4889-9D5F-E02E4DC4460A}" type="slidenum">
               <a:t>&lt;#&gt;</a:t>
             </a:fld>
           </a:p>
@@ -5540,7 +5544,7 @@
         <p:txBody>
           <a:bodyPr/>
           <a:p>
-            <a:fld id="{594EE47A-36EA-46FA-A9B6-1915AE08E603}" type="slidenum">
+            <a:fld id="{95010B13-45DC-4513-9DD6-86508ACA0ACC}" type="slidenum">
               <a:t>&lt;#&gt;</a:t>
             </a:fld>
           </a:p>
@@ -5694,7 +5698,7 @@
         <p:txBody>
           <a:bodyPr/>
           <a:p>
-            <a:fld id="{31209A85-3883-4832-B26B-33085E94327F}" type="slidenum">
+            <a:fld id="{4B2BA369-5327-4EC1-8F84-69F68777D201}" type="slidenum">
               <a:t>&lt;#&gt;</a:t>
             </a:fld>
           </a:p>
@@ -6009,7 +6013,7 @@
         <p:txBody>
           <a:bodyPr/>
           <a:p>
-            <a:fld id="{0B5A6679-3CF5-4FE6-8F4D-B28648275D88}" type="slidenum">
+            <a:fld id="{19735058-0BC8-4771-B5BA-22E7D5C59A3D}" type="slidenum">
               <a:t>&lt;#&gt;</a:t>
             </a:fld>
           </a:p>
@@ -6129,7 +6133,7 @@
         <p:txBody>
           <a:bodyPr/>
           <a:p>
-            <a:fld id="{1B9BD339-3CCE-4FA4-8016-345733296D9E}" type="slidenum">
+            <a:fld id="{1BCFD9EF-EF22-4FDB-A821-F47B81F75154}" type="slidenum">
               <a:t>&lt;#&gt;</a:t>
             </a:fld>
           </a:p>
@@ -6249,7 +6253,7 @@
         <p:txBody>
           <a:bodyPr/>
           <a:p>
-            <a:fld id="{6AEAB06A-83FD-44EA-97E3-18E8B48833A7}" type="slidenum">
+            <a:fld id="{6FE9A439-6D9B-460E-8A8F-BA4132798339}" type="slidenum">
               <a:t>&lt;#&gt;</a:t>
             </a:fld>
           </a:p>
@@ -6471,7 +6475,7 @@
         <p:txBody>
           <a:bodyPr/>
           <a:p>
-            <a:fld id="{899DC17E-5FE4-430F-BB4D-D5A13F62BC20}" type="slidenum">
+            <a:fld id="{8F39ED7C-7F8D-4327-9666-A70BB579C571}" type="slidenum">
               <a:t>&lt;#&gt;</a:t>
             </a:fld>
           </a:p>
@@ -6693,7 +6697,7 @@
         <p:txBody>
           <a:bodyPr/>
           <a:p>
-            <a:fld id="{274984DE-64CA-44DE-93C2-90A5849CCE10}" type="slidenum">
+            <a:fld id="{BBAC77E4-B03E-424D-B387-93E2E3ED7C33}" type="slidenum">
               <a:t>&lt;#&gt;</a:t>
             </a:fld>
           </a:p>
@@ -6915,7 +6919,7 @@
         <p:txBody>
           <a:bodyPr/>
           <a:p>
-            <a:fld id="{461F6430-5A3D-4DCF-9C00-6A15BDF5D6BD}" type="slidenum">
+            <a:fld id="{66ED1BC8-F450-40D1-A1F7-917EC424A516}" type="slidenum">
               <a:t>&lt;#&gt;</a:t>
             </a:fld>
           </a:p>
@@ -7103,7 +7107,7 @@
         <p:txBody>
           <a:bodyPr/>
           <a:p>
-            <a:fld id="{6D634CFD-6455-4295-A2A8-4D3CE3E0A24A}" type="slidenum">
+            <a:fld id="{BCFB8729-3155-42E0-B73F-8839334B35FC}" type="slidenum">
               <a:t>&lt;#&gt;</a:t>
             </a:fld>
           </a:p>
@@ -7359,7 +7363,7 @@
         <p:txBody>
           <a:bodyPr/>
           <a:p>
-            <a:fld id="{BC5A69D6-6D61-4392-99E5-270615BF228B}" type="slidenum">
+            <a:fld id="{69FB4081-13FF-432B-AAA3-6AAC3AB81FE0}" type="slidenum">
               <a:t>&lt;#&gt;</a:t>
             </a:fld>
           </a:p>
@@ -7683,7 +7687,7 @@
         <p:txBody>
           <a:bodyPr/>
           <a:p>
-            <a:fld id="{A11D77E0-B9FB-4E4F-8831-B894B93BEC13}" type="slidenum">
+            <a:fld id="{B7FB09D5-A2E7-43A6-93F5-37D50BA3F6F2}" type="slidenum">
               <a:t>&lt;#&gt;</a:t>
             </a:fld>
           </a:p>
@@ -7766,7 +7770,7 @@
         <p:txBody>
           <a:bodyPr/>
           <a:p>
-            <a:fld id="{BFDF3F8A-7CC4-40FD-AEFF-50D8689FCC56}" type="slidenum">
+            <a:fld id="{0C276324-6245-413A-847F-78C89142E90D}" type="slidenum">
               <a:t>&lt;#&gt;</a:t>
             </a:fld>
           </a:p>
@@ -7982,7 +7986,7 @@
         <p:txBody>
           <a:bodyPr/>
           <a:p>
-            <a:fld id="{4B3BED3C-9547-47AA-B631-CBDD9C1B19E4}" type="slidenum">
+            <a:fld id="{FC3A5CDF-A6DF-449C-8781-D3129BD06F64}" type="slidenum">
               <a:t>&lt;#&gt;</a:t>
             </a:fld>
           </a:p>
@@ -8136,7 +8140,7 @@
         <p:txBody>
           <a:bodyPr/>
           <a:p>
-            <a:fld id="{920961A1-92B0-4E78-8595-255615B447C0}" type="slidenum">
+            <a:fld id="{215EB935-E6F9-4DD2-99A8-51ADB019399B}" type="slidenum">
               <a:t>&lt;#&gt;</a:t>
             </a:fld>
           </a:p>
@@ -8324,7 +8328,7 @@
         <p:txBody>
           <a:bodyPr/>
           <a:p>
-            <a:fld id="{37349DC4-AB93-4909-A448-00A78497B308}" type="slidenum">
+            <a:fld id="{90E9A0A7-61D6-4AF3-83AC-47DAA6696666}" type="slidenum">
               <a:t>&lt;#&gt;</a:t>
             </a:fld>
           </a:p>
@@ -8444,7 +8448,7 @@
         <p:txBody>
           <a:bodyPr/>
           <a:p>
-            <a:fld id="{D209365E-DD4C-4984-9B3B-D377B7AFD2B4}" type="slidenum">
+            <a:fld id="{25C7D23B-2A11-401B-B48C-576F46406420}" type="slidenum">
               <a:t>&lt;#&gt;</a:t>
             </a:fld>
           </a:p>
@@ -8564,7 +8568,7 @@
         <p:txBody>
           <a:bodyPr/>
           <a:p>
-            <a:fld id="{3C92BC09-4524-4357-8F92-C2197A3E991B}" type="slidenum">
+            <a:fld id="{08EC9FDC-B610-4E80-AABA-9015288A25AB}" type="slidenum">
               <a:t>&lt;#&gt;</a:t>
             </a:fld>
           </a:p>
@@ -8786,7 +8790,7 @@
         <p:txBody>
           <a:bodyPr/>
           <a:p>
-            <a:fld id="{FD49ACA2-A760-46C5-8951-C90BC04E29BB}" type="slidenum">
+            <a:fld id="{1A53270A-A8BF-4155-87CC-28F4FD29E890}" type="slidenum">
               <a:t>&lt;#&gt;</a:t>
             </a:fld>
           </a:p>
@@ -9008,7 +9012,7 @@
         <p:txBody>
           <a:bodyPr/>
           <a:p>
-            <a:fld id="{2AB8FC61-0090-4E8F-99ED-C4453E21F6BB}" type="slidenum">
+            <a:fld id="{2E011AAC-EBF8-4A37-91A1-F9C333A8B838}" type="slidenum">
               <a:t>&lt;#&gt;</a:t>
             </a:fld>
           </a:p>
@@ -9230,7 +9234,7 @@
         <p:txBody>
           <a:bodyPr/>
           <a:p>
-            <a:fld id="{79F6337F-0985-48C4-96F0-BFDB01308402}" type="slidenum">
+            <a:fld id="{1CDA9B0A-81C0-47DC-B5C3-7EDD078C8ABC}" type="slidenum">
               <a:t>&lt;#&gt;</a:t>
             </a:fld>
           </a:p>
@@ -9418,7 +9422,7 @@
         <p:txBody>
           <a:bodyPr/>
           <a:p>
-            <a:fld id="{FF252D66-DAA0-4503-89E0-138EB49B816A}" type="slidenum">
+            <a:fld id="{ADAB9ADF-7DA5-4474-AC13-0F8859695C9F}" type="slidenum">
               <a:t>&lt;#&gt;</a:t>
             </a:fld>
           </a:p>
@@ -9674,7 +9678,7 @@
         <p:txBody>
           <a:bodyPr/>
           <a:p>
-            <a:fld id="{02CA00FF-B76D-4A9B-9B80-A729F7DA0A5F}" type="slidenum">
+            <a:fld id="{FD663C09-185A-46E3-8C06-72F60ADD461D}" type="slidenum">
               <a:t>&lt;#&gt;</a:t>
             </a:fld>
           </a:p>
@@ -10057,7 +10061,7 @@
         <p:txBody>
           <a:bodyPr/>
           <a:p>
-            <a:fld id="{1CDB0A1A-4F48-4259-A8C2-3464E16A90A8}" type="slidenum">
+            <a:fld id="{D8A794AF-A02D-4514-B733-B85CFE5FB61A}" type="slidenum">
               <a:t>&lt;#&gt;</a:t>
             </a:fld>
           </a:p>
@@ -10770,7 +10774,7 @@
               </a:lnSpc>
               <a:buNone/>
             </a:pPr>
-            <a:fld id="{EC6ADA5D-B964-4E45-84E1-1CCCFCBAF1AF}" type="slidenum">
+            <a:fld id="{28B23AAB-797A-4127-B72D-9338460D7040}" type="slidenum">
               <a:rPr b="0" lang="en-US" sz="1400" spc="-1" strike="noStrike">
                 <a:solidFill>
                   <a:srgbClr val="ffffff"/>
@@ -10778,7 +10782,7 @@
                 <a:latin typeface="Arial"/>
                 <a:ea typeface="DejaVu Sans"/>
               </a:rPr>
-              <a:t>3</a:t>
+              <a:t>&lt;number&gt;</a:t>
             </a:fld>
             <a:endParaRPr b="0" lang="en-US" sz="1400" spc="-1" strike="noStrike">
               <a:latin typeface="Arial"/>
@@ -10875,7 +10879,13 @@
               <a:rPr b="0" lang="en-US" sz="3200" spc="-1" strike="noStrike">
                 <a:latin typeface="Arial"/>
               </a:rPr>
-              <a:t>outline text format</a:t>
+              <a:t>outline text </a:t>
+            </a:r>
+            <a:r>
+              <a:rPr b="0" lang="en-US" sz="3200" spc="-1" strike="noStrike">
+                <a:latin typeface="Arial"/>
+              </a:rPr>
+              <a:t>format</a:t>
             </a:r>
             <a:endParaRPr b="0" lang="en-US" sz="3200" spc="-1" strike="noStrike">
               <a:latin typeface="Arial"/>
@@ -10897,7 +10907,13 @@
               <a:rPr b="0" lang="en-US" sz="2800" spc="-1" strike="noStrike">
                 <a:latin typeface="Arial"/>
               </a:rPr>
-              <a:t>Second Outline Level</a:t>
+              <a:t>Second </a:t>
+            </a:r>
+            <a:r>
+              <a:rPr b="0" lang="en-US" sz="2800" spc="-1" strike="noStrike">
+                <a:latin typeface="Arial"/>
+              </a:rPr>
+              <a:t>Outline Level</a:t>
             </a:r>
             <a:endParaRPr b="0" lang="en-US" sz="2800" spc="-1" strike="noStrike">
               <a:latin typeface="Arial"/>
@@ -10919,7 +10935,13 @@
               <a:rPr b="0" lang="en-US" sz="2400" spc="-1" strike="noStrike">
                 <a:latin typeface="Arial"/>
               </a:rPr>
-              <a:t>Third Outline Level</a:t>
+              <a:t>Third Outline </a:t>
+            </a:r>
+            <a:r>
+              <a:rPr b="0" lang="en-US" sz="2400" spc="-1" strike="noStrike">
+                <a:latin typeface="Arial"/>
+              </a:rPr>
+              <a:t>Level</a:t>
             </a:r>
             <a:endParaRPr b="0" lang="en-US" sz="2400" spc="-1" strike="noStrike">
               <a:latin typeface="Arial"/>
@@ -10941,7 +10963,13 @@
               <a:rPr b="0" lang="en-US" sz="2000" spc="-1" strike="noStrike">
                 <a:latin typeface="Arial"/>
               </a:rPr>
-              <a:t>Fourth Outline Level</a:t>
+              <a:t>Fourth </a:t>
+            </a:r>
+            <a:r>
+              <a:rPr b="0" lang="en-US" sz="2000" spc="-1" strike="noStrike">
+                <a:latin typeface="Arial"/>
+              </a:rPr>
+              <a:t>Outline Level</a:t>
             </a:r>
             <a:endParaRPr b="0" lang="en-US" sz="2000" spc="-1" strike="noStrike">
               <a:latin typeface="Arial"/>
@@ -10963,7 +10991,19 @@
               <a:rPr b="0" lang="en-US" sz="2000" spc="-1" strike="noStrike">
                 <a:latin typeface="Arial"/>
               </a:rPr>
-              <a:t>Fifth Outline Level</a:t>
+              <a:t>Fifth </a:t>
+            </a:r>
+            <a:r>
+              <a:rPr b="0" lang="en-US" sz="2000" spc="-1" strike="noStrike">
+                <a:latin typeface="Arial"/>
+              </a:rPr>
+              <a:t>Outline </a:t>
+            </a:r>
+            <a:r>
+              <a:rPr b="0" lang="en-US" sz="2000" spc="-1" strike="noStrike">
+                <a:latin typeface="Arial"/>
+              </a:rPr>
+              <a:t>Level</a:t>
             </a:r>
             <a:endParaRPr b="0" lang="en-US" sz="2000" spc="-1" strike="noStrike">
               <a:latin typeface="Arial"/>
@@ -10985,7 +11025,19 @@
               <a:rPr b="0" lang="en-US" sz="2000" spc="-1" strike="noStrike">
                 <a:latin typeface="Arial"/>
               </a:rPr>
-              <a:t>Sixth Outline </a:t>
+              <a:t>Sixth </a:t>
+            </a:r>
+            <a:r>
+              <a:rPr b="0" lang="en-US" sz="2000" spc="-1" strike="noStrike">
+                <a:latin typeface="Arial"/>
+              </a:rPr>
+              <a:t>Outlin</a:t>
+            </a:r>
+            <a:r>
+              <a:rPr b="0" lang="en-US" sz="2000" spc="-1" strike="noStrike">
+                <a:latin typeface="Arial"/>
+              </a:rPr>
+              <a:t>e </a:t>
             </a:r>
             <a:r>
               <a:rPr b="0" lang="en-US" sz="2000" spc="-1" strike="noStrike">
@@ -11013,13 +11065,85 @@
               <a:rPr b="0" lang="en-US" sz="2000" spc="-1" strike="noStrike">
                 <a:latin typeface="Arial"/>
               </a:rPr>
-              <a:t>Seventh </a:t>
+              <a:t>S</a:t>
             </a:r>
             <a:r>
               <a:rPr b="0" lang="en-US" sz="2000" spc="-1" strike="noStrike">
                 <a:latin typeface="Arial"/>
               </a:rPr>
-              <a:t>Outline Level</a:t>
+              <a:t>e</a:t>
+            </a:r>
+            <a:r>
+              <a:rPr b="0" lang="en-US" sz="2000" spc="-1" strike="noStrike">
+                <a:latin typeface="Arial"/>
+              </a:rPr>
+              <a:t>v</a:t>
+            </a:r>
+            <a:r>
+              <a:rPr b="0" lang="en-US" sz="2000" spc="-1" strike="noStrike">
+                <a:latin typeface="Arial"/>
+              </a:rPr>
+              <a:t>e</a:t>
+            </a:r>
+            <a:r>
+              <a:rPr b="0" lang="en-US" sz="2000" spc="-1" strike="noStrike">
+                <a:latin typeface="Arial"/>
+              </a:rPr>
+              <a:t>nt</a:t>
+            </a:r>
+            <a:r>
+              <a:rPr b="0" lang="en-US" sz="2000" spc="-1" strike="noStrike">
+                <a:latin typeface="Arial"/>
+              </a:rPr>
+              <a:t>h </a:t>
+            </a:r>
+            <a:r>
+              <a:rPr b="0" lang="en-US" sz="2000" spc="-1" strike="noStrike">
+                <a:latin typeface="Arial"/>
+              </a:rPr>
+              <a:t>O</a:t>
+            </a:r>
+            <a:r>
+              <a:rPr b="0" lang="en-US" sz="2000" spc="-1" strike="noStrike">
+                <a:latin typeface="Arial"/>
+              </a:rPr>
+              <a:t>ut</a:t>
+            </a:r>
+            <a:r>
+              <a:rPr b="0" lang="en-US" sz="2000" spc="-1" strike="noStrike">
+                <a:latin typeface="Arial"/>
+              </a:rPr>
+              <a:t>lin</a:t>
+            </a:r>
+            <a:r>
+              <a:rPr b="0" lang="en-US" sz="2000" spc="-1" strike="noStrike">
+                <a:latin typeface="Arial"/>
+              </a:rPr>
+              <a:t>e </a:t>
+            </a:r>
+            <a:r>
+              <a:rPr b="0" lang="en-US" sz="2000" spc="-1" strike="noStrike">
+                <a:latin typeface="Arial"/>
+              </a:rPr>
+              <a:t>L</a:t>
+            </a:r>
+            <a:r>
+              <a:rPr b="0" lang="en-US" sz="2000" spc="-1" strike="noStrike">
+                <a:latin typeface="Arial"/>
+              </a:rPr>
+              <a:t>e</a:t>
+            </a:r>
+            <a:r>
+              <a:rPr b="0" lang="en-US" sz="2000" spc="-1" strike="noStrike">
+                <a:latin typeface="Arial"/>
+              </a:rPr>
+              <a:t>v</a:t>
+            </a:r>
+            <a:r>
+              <a:rPr b="0" lang="en-US" sz="2000" spc="-1" strike="noStrike">
+                <a:latin typeface="Arial"/>
+              </a:rPr>
+              <a:t>el</a:t>
             </a:r>
             <a:endParaRPr b="0" lang="en-US" sz="2000" spc="-1" strike="noStrike">
               <a:latin typeface="Arial"/>
@@ -11663,7 +11787,7 @@
               </a:lnSpc>
               <a:buNone/>
             </a:pPr>
-            <a:fld id="{EC671A6B-C457-4769-965D-6D7B04CAF150}" type="slidenum">
+            <a:fld id="{2C902A37-BDF1-4AE9-B05F-548A29FAE63F}" type="slidenum">
               <a:rPr b="0" lang="en-US" sz="1400" spc="-1" strike="noStrike">
                 <a:solidFill>
                   <a:srgbClr val="ffffff"/>
@@ -11955,7 +12079,7 @@
               </a:lnSpc>
               <a:buNone/>
             </a:pPr>
-            <a:fld id="{D4643BA6-818A-4AEF-AEF8-58A9BF398EF3}" type="slidenum">
+            <a:fld id="{F9478928-0E2E-48B1-B00F-54849772E0A4}" type="slidenum">
               <a:rPr b="0" lang="en-US" sz="1400" spc="-1" strike="noStrike">
                 <a:solidFill>
                   <a:srgbClr val="ffffff"/>
@@ -12760,7 +12884,13 @@
               <a:rPr b="0" lang="en-US" sz="1800" spc="-1" strike="noStrike">
                 <a:latin typeface="Arial"/>
               </a:rPr>
-              <a:t>Seventh Outline Level</a:t>
+              <a:t>Seventh Outline </a:t>
+            </a:r>
+            <a:r>
+              <a:rPr b="0" lang="en-US" sz="1800" spc="-1" strike="noStrike">
+                <a:latin typeface="Arial"/>
+              </a:rPr>
+              <a:t>Level</a:t>
             </a:r>
             <a:endParaRPr b="0" lang="en-US" sz="1800" spc="-1" strike="noStrike">
               <a:latin typeface="Arial"/>
@@ -13245,7 +13375,7 @@
               </a:lnSpc>
               <a:buNone/>
             </a:pPr>
-            <a:fld id="{C3989758-E29E-496A-B486-5F162D6064AC}" type="slidenum">
+            <a:fld id="{F71EB4FD-1EA1-4E55-937A-E36D09ABB481}" type="slidenum">
               <a:rPr b="0" lang="en-US" sz="1400" spc="-1" strike="noStrike">
                 <a:solidFill>
                   <a:srgbClr val="ffffff"/>
@@ -14126,7 +14256,7 @@
               </a:lnSpc>
               <a:buNone/>
             </a:pPr>
-            <a:fld id="{C049E15B-4EC8-4AEB-B8ED-18F1DEE0C365}" type="slidenum">
+            <a:fld id="{70869D62-05FC-46D1-807A-1D2E82E5D1CF}" type="slidenum">
               <a:rPr b="0" lang="en-US" sz="1400" spc="-1" strike="noStrike">
                 <a:solidFill>
                   <a:srgbClr val="ffffff"/>
@@ -14287,6 +14417,892 @@
 </p:sld>
 </file>
 
+<file path=ppt/slides/slide10.xml><?xml version="1.0" encoding="utf-8"?>
+<p:sld xmlns:a="http://schemas.openxmlformats.org/drawingml/2006/main" xmlns:p="http://schemas.openxmlformats.org/presentationml/2006/main" xmlns:r="http://schemas.openxmlformats.org/officeDocument/2006/relationships" xmlns:p14="http://schemas.microsoft.com/office/powerpoint/2010/main" xmlns:p15="http://schemas.microsoft.com/office/powerpoint/2012/main" xmlns:mc="http://schemas.openxmlformats.org/markup-compatibility/2006">
+  <p:cSld>
+    <p:spTree>
+      <p:nvGrpSpPr>
+        <p:cNvPr id="1" name=""/>
+        <p:cNvGrpSpPr/>
+        <p:nvPr/>
+      </p:nvGrpSpPr>
+      <p:grpSpPr>
+        <a:xfrm>
+          <a:off x="0" y="0"/>
+          <a:ext cx="0" cy="0"/>
+          <a:chOff x="0" y="0"/>
+          <a:chExt cx="0" cy="0"/>
+        </a:xfrm>
+      </p:grpSpPr>
+      <p:sp>
+        <p:nvSpPr>
+          <p:cNvPr id="245" name="PlaceHolder 1"/>
+          <p:cNvSpPr>
+            <a:spLocks noGrp="1"/>
+          </p:cNvSpPr>
+          <p:nvPr>
+            <p:ph type="title"/>
+          </p:nvPr>
+        </p:nvSpPr>
+        <p:spPr>
+          <a:xfrm>
+            <a:off x="360000" y="106200"/>
+            <a:ext cx="9359280" cy="624960"/>
+          </a:xfrm>
+          <a:prstGeom prst="rect">
+            <a:avLst/>
+          </a:prstGeom>
+          <a:noFill/>
+          <a:ln w="0">
+            <a:noFill/>
+          </a:ln>
+        </p:spPr>
+        <p:txBody>
+          <a:bodyPr lIns="0" rIns="0" tIns="0" bIns="0" anchor="ctr">
+            <a:noAutofit/>
+          </a:bodyPr>
+          <a:p>
+            <a:pPr algn="ctr">
+              <a:lnSpc>
+                <a:spcPct val="100000"/>
+              </a:lnSpc>
+              <a:buNone/>
+            </a:pPr>
+            <a:r>
+              <a:rPr b="0" lang="en-US" sz="4400" spc="-1" strike="noStrike">
+                <a:latin typeface="Arial"/>
+              </a:rPr>
+              <a:t>T42 - Language</a:t>
+            </a:r>
+            <a:endParaRPr b="0" lang="en-US" sz="4400" spc="-1" strike="noStrike">
+              <a:latin typeface="Arial"/>
+            </a:endParaRPr>
+          </a:p>
+        </p:txBody>
+      </p:sp>
+      <p:sp>
+        <p:nvSpPr>
+          <p:cNvPr id="246" name="PlaceHolder 2"/>
+          <p:cNvSpPr>
+            <a:spLocks noGrp="1"/>
+          </p:cNvSpPr>
+          <p:nvPr>
+            <p:ph/>
+          </p:nvPr>
+        </p:nvSpPr>
+        <p:spPr>
+          <a:xfrm>
+            <a:off x="360000" y="1080000"/>
+            <a:ext cx="4566960" cy="2805840"/>
+          </a:xfrm>
+          <a:prstGeom prst="rect">
+            <a:avLst/>
+          </a:prstGeom>
+          <a:noFill/>
+          <a:ln w="0">
+            <a:noFill/>
+          </a:ln>
+        </p:spPr>
+        <p:txBody>
+          <a:bodyPr lIns="0" rIns="0" tIns="0" bIns="0" anchor="t">
+            <a:normAutofit/>
+          </a:bodyPr>
+          <a:p>
+            <a:pPr lvl="1" marL="864000" indent="-324000">
+              <a:lnSpc>
+                <a:spcPct val="100000"/>
+              </a:lnSpc>
+              <a:spcBef>
+                <a:spcPts val="1134"/>
+              </a:spcBef>
+              <a:buClr>
+                <a:srgbClr val="000000"/>
+              </a:buClr>
+              <a:buSzPct val="75000"/>
+              <a:buFont typeface="Symbol"/>
+              <a:buChar char=""/>
+            </a:pPr>
+            <a:r>
+              <a:rPr b="0" lang="en-US" sz="1500" spc="-1" strike="noStrike">
+                <a:solidFill>
+                  <a:srgbClr val="009bdd"/>
+                </a:solidFill>
+                <a:latin typeface="Arial"/>
+                <a:ea typeface="Noto Sans CJK SC"/>
+              </a:rPr>
+              <a:t>Especially vulnerable are those who speak indigenous language – 1/25 parties (Kechi, Mixteco…) </a:t>
+            </a:r>
+            <a:r>
+              <a:rPr b="0" lang="en-US" sz="1000" spc="-1" strike="noStrike">
+                <a:solidFill>
+                  <a:srgbClr val="009bdd"/>
+                </a:solidFill>
+                <a:latin typeface="Arial"/>
+                <a:ea typeface="Noto Sans CJK SC"/>
+              </a:rPr>
+              <a:t>(From T42 Screening Airtables)</a:t>
+            </a:r>
+            <a:r>
+              <a:rPr b="0" lang="en-US" sz="1500" spc="-1" strike="noStrike">
+                <a:solidFill>
+                  <a:srgbClr val="009bdd"/>
+                </a:solidFill>
+                <a:latin typeface="Arial"/>
+                <a:ea typeface="Noto Sans CJK SC"/>
+              </a:rPr>
+              <a:t>, routinely taken advantage of </a:t>
+            </a:r>
+            <a:r>
+              <a:rPr b="1" lang="en-US" sz="1500" spc="-1" strike="noStrike">
+                <a:solidFill>
+                  <a:srgbClr val="009bdd"/>
+                </a:solidFill>
+                <a:latin typeface="Arial"/>
+                <a:ea typeface="Noto Sans CJK SC"/>
+              </a:rPr>
+              <a:t>( add some personal story here and data about if they suffer more…) </a:t>
+            </a:r>
+            <a:endParaRPr b="0" lang="en-US" sz="1500" spc="-1" strike="noStrike">
+              <a:latin typeface="Arial"/>
+            </a:endParaRPr>
+          </a:p>
+          <a:p>
+            <a:pPr>
+              <a:lnSpc>
+                <a:spcPct val="100000"/>
+              </a:lnSpc>
+              <a:spcBef>
+                <a:spcPts val="1417"/>
+              </a:spcBef>
+              <a:buNone/>
+            </a:pPr>
+            <a:endParaRPr b="0" lang="en-US" sz="2800" spc="-1" strike="noStrike">
+              <a:latin typeface="Arial"/>
+            </a:endParaRPr>
+          </a:p>
+        </p:txBody>
+      </p:sp>
+      <p:pic>
+        <p:nvPicPr>
+          <p:cNvPr id="247" name="" descr=""/>
+          <p:cNvPicPr/>
+          <p:nvPr/>
+        </p:nvPicPr>
+        <p:blipFill>
+          <a:blip r:embed="rId1"/>
+          <a:stretch/>
+        </p:blipFill>
+        <p:spPr>
+          <a:xfrm>
+            <a:off x="5257800" y="712080"/>
+            <a:ext cx="3530520" cy="4088160"/>
+          </a:xfrm>
+          <a:prstGeom prst="rect">
+            <a:avLst/>
+          </a:prstGeom>
+          <a:ln w="0">
+            <a:noFill/>
+          </a:ln>
+        </p:spPr>
+      </p:pic>
+      <p:sp>
+        <p:nvSpPr>
+          <p:cNvPr id="4" name="PlaceHolder 3"/>
+          <p:cNvSpPr>
+            <a:spLocks noGrp="1"/>
+          </p:cNvSpPr>
+          <p:nvPr>
+            <p:ph type="sldNum" idx="11"/>
+          </p:nvPr>
+        </p:nvSpPr>
+        <p:spPr/>
+        <p:txBody>
+          <a:bodyPr/>
+          <a:p>
+            <a:fld id="{D141EE2F-8979-4188-A0EB-D2577D7EA286}" type="slidenum">
+              <a:t>10</a:t>
+            </a:fld>
+          </a:p>
+        </p:txBody>
+      </p:sp>
+      <p:sp>
+        <p:nvSpPr>
+          <p:cNvPr id="5" name="PlaceHolder 4"/>
+          <p:cNvSpPr>
+            <a:spLocks noGrp="1"/>
+          </p:cNvSpPr>
+          <p:nvPr>
+            <p:ph type="dt" idx="12"/>
+          </p:nvPr>
+        </p:nvSpPr>
+        <p:spPr/>
+        <p:txBody>
+          <a:bodyPr/>
+          <a:p>
+            <a:fld id="{B280009C-2DB9-48F6-B712-7FBAD4E9D1BD}" type="datetime1">
+              <a:rPr lang="en-US"/>
+              <a:t>03/26/2024</a:t>
+            </a:fld>
+          </a:p>
+        </p:txBody>
+      </p:sp>
+    </p:spTree>
+  </p:cSld>
+  <mc:AlternateContent>
+    <mc:Choice Requires="p14">
+      <p:transition spd="slow" p14:dur="2000"/>
+    </mc:Choice>
+    <mc:Fallback>
+      <p:transition spd="slow"/>
+    </mc:Fallback>
+  </mc:AlternateContent>
+</p:sld>
+</file>
+
+<file path=ppt/slides/slide11.xml><?xml version="1.0" encoding="utf-8"?>
+<p:sld xmlns:a="http://schemas.openxmlformats.org/drawingml/2006/main" xmlns:p="http://schemas.openxmlformats.org/presentationml/2006/main" xmlns:r="http://schemas.openxmlformats.org/officeDocument/2006/relationships" xmlns:p14="http://schemas.microsoft.com/office/powerpoint/2010/main" xmlns:p15="http://schemas.microsoft.com/office/powerpoint/2012/main" xmlns:mc="http://schemas.openxmlformats.org/markup-compatibility/2006">
+  <p:cSld>
+    <p:spTree>
+      <p:nvGrpSpPr>
+        <p:cNvPr id="1" name=""/>
+        <p:cNvGrpSpPr/>
+        <p:nvPr/>
+      </p:nvGrpSpPr>
+      <p:grpSpPr>
+        <a:xfrm>
+          <a:off x="0" y="0"/>
+          <a:ext cx="0" cy="0"/>
+          <a:chOff x="0" y="0"/>
+          <a:chExt cx="0" cy="0"/>
+        </a:xfrm>
+      </p:grpSpPr>
+      <p:sp>
+        <p:nvSpPr>
+          <p:cNvPr id="248" name="PlaceHolder 1"/>
+          <p:cNvSpPr>
+            <a:spLocks noGrp="1"/>
+          </p:cNvSpPr>
+          <p:nvPr>
+            <p:ph type="title"/>
+          </p:nvPr>
+        </p:nvSpPr>
+        <p:spPr>
+          <a:xfrm>
+            <a:off x="360000" y="106200"/>
+            <a:ext cx="9359280" cy="624960"/>
+          </a:xfrm>
+          <a:prstGeom prst="rect">
+            <a:avLst/>
+          </a:prstGeom>
+          <a:noFill/>
+          <a:ln w="0">
+            <a:noFill/>
+          </a:ln>
+        </p:spPr>
+        <p:txBody>
+          <a:bodyPr lIns="0" rIns="0" tIns="0" bIns="0" anchor="ctr">
+            <a:noAutofit/>
+          </a:bodyPr>
+          <a:p>
+            <a:pPr algn="ctr">
+              <a:lnSpc>
+                <a:spcPct val="100000"/>
+              </a:lnSpc>
+              <a:buNone/>
+            </a:pPr>
+            <a:r>
+              <a:rPr b="0" lang="en-US" sz="4400" spc="-1" strike="noStrike">
+                <a:latin typeface="Arial"/>
+              </a:rPr>
+              <a:t>LGBTQ+ Observations</a:t>
+            </a:r>
+            <a:endParaRPr b="0" lang="en-US" sz="4400" spc="-1" strike="noStrike">
+              <a:latin typeface="Arial"/>
+            </a:endParaRPr>
+          </a:p>
+        </p:txBody>
+      </p:sp>
+      <p:pic>
+        <p:nvPicPr>
+          <p:cNvPr id="249" name="" descr=""/>
+          <p:cNvPicPr/>
+          <p:nvPr/>
+        </p:nvPicPr>
+        <p:blipFill>
+          <a:blip r:embed="rId1"/>
+          <a:stretch/>
+        </p:blipFill>
+        <p:spPr>
+          <a:xfrm>
+            <a:off x="3200400" y="1371600"/>
+            <a:ext cx="6857640" cy="3668400"/>
+          </a:xfrm>
+          <a:prstGeom prst="rect">
+            <a:avLst/>
+          </a:prstGeom>
+          <a:ln w="0">
+            <a:noFill/>
+          </a:ln>
+        </p:spPr>
+      </p:pic>
+      <p:sp>
+        <p:nvSpPr>
+          <p:cNvPr id="250" name="PlaceHolder 2"/>
+          <p:cNvSpPr>
+            <a:spLocks noGrp="1"/>
+          </p:cNvSpPr>
+          <p:nvPr>
+            <p:ph/>
+          </p:nvPr>
+        </p:nvSpPr>
+        <p:spPr>
+          <a:xfrm>
+            <a:off x="360000" y="914400"/>
+            <a:ext cx="2840040" cy="1716480"/>
+          </a:xfrm>
+          <a:prstGeom prst="rect">
+            <a:avLst/>
+          </a:prstGeom>
+          <a:noFill/>
+          <a:ln w="0">
+            <a:noFill/>
+          </a:ln>
+        </p:spPr>
+        <p:txBody>
+          <a:bodyPr lIns="0" rIns="0" tIns="0" bIns="0" anchor="t">
+            <a:normAutofit fontScale="78000"/>
+          </a:bodyPr>
+          <a:p>
+            <a:pPr marL="432000" indent="-324000">
+              <a:lnSpc>
+                <a:spcPct val="100000"/>
+              </a:lnSpc>
+              <a:spcBef>
+                <a:spcPts val="1417"/>
+              </a:spcBef>
+              <a:buClr>
+                <a:srgbClr val="000000"/>
+              </a:buClr>
+              <a:buSzPct val="45000"/>
+              <a:buFont typeface="Wingdings" charset="2"/>
+              <a:buChar char=""/>
+            </a:pPr>
+            <a:r>
+              <a:rPr b="1" lang="en-US" sz="1500" spc="-1" strike="noStrike">
+                <a:latin typeface="Arial"/>
+              </a:rPr>
+              <a:t>15% of all immigrant parties cite LGBTQ+ reasons for emigrating</a:t>
+            </a:r>
+            <a:endParaRPr b="0" lang="en-US" sz="1500" spc="-1" strike="noStrike">
+              <a:latin typeface="Arial"/>
+            </a:endParaRPr>
+          </a:p>
+          <a:p>
+            <a:pPr marL="432000" indent="-324000">
+              <a:lnSpc>
+                <a:spcPct val="100000"/>
+              </a:lnSpc>
+              <a:spcBef>
+                <a:spcPts val="1417"/>
+              </a:spcBef>
+              <a:buClr>
+                <a:srgbClr val="000000"/>
+              </a:buClr>
+              <a:buSzPct val="45000"/>
+              <a:buFont typeface="Wingdings" charset="2"/>
+              <a:buChar char=""/>
+            </a:pPr>
+            <a:r>
+              <a:rPr b="0" lang="en-US" sz="1500" spc="-1" strike="noStrike">
+                <a:latin typeface="Arial"/>
+              </a:rPr>
+              <a:t>Countries such as Nicaragua which rank low on friendliness for LGBTQ+ people have high percentage of LGBTQ+ migrants – </a:t>
+            </a:r>
+            <a:endParaRPr b="0" lang="en-US" sz="1500" spc="-1" strike="noStrike">
+              <a:latin typeface="Arial"/>
+            </a:endParaRPr>
+          </a:p>
+          <a:p>
+            <a:pPr lvl="1" marL="864000" indent="-324000">
+              <a:lnSpc>
+                <a:spcPct val="100000"/>
+              </a:lnSpc>
+              <a:spcBef>
+                <a:spcPts val="1134"/>
+              </a:spcBef>
+              <a:buClr>
+                <a:srgbClr val="000000"/>
+              </a:buClr>
+              <a:buSzPct val="75000"/>
+              <a:buFont typeface="Symbol"/>
+              <a:buChar char=""/>
+            </a:pPr>
+            <a:r>
+              <a:rPr b="0" lang="en-US" sz="1500" spc="-1" strike="noStrike">
+                <a:latin typeface="Arial"/>
+              </a:rPr>
+              <a:t>Subject to a lot of discrimination and crime for sexuality/gender</a:t>
+            </a:r>
+            <a:endParaRPr b="0" lang="en-US" sz="1500" spc="-1" strike="noStrike">
+              <a:latin typeface="Arial"/>
+            </a:endParaRPr>
+          </a:p>
+        </p:txBody>
+      </p:sp>
+      <p:sp>
+        <p:nvSpPr>
+          <p:cNvPr id="4" name="PlaceHolder 3"/>
+          <p:cNvSpPr>
+            <a:spLocks noGrp="1"/>
+          </p:cNvSpPr>
+          <p:nvPr>
+            <p:ph type="sldNum" idx="11"/>
+          </p:nvPr>
+        </p:nvSpPr>
+        <p:spPr/>
+        <p:txBody>
+          <a:bodyPr/>
+          <a:p>
+            <a:fld id="{6E549B11-1289-4B72-8837-FA2EDFB918C6}" type="slidenum">
+              <a:t>11</a:t>
+            </a:fld>
+          </a:p>
+        </p:txBody>
+      </p:sp>
+      <p:sp>
+        <p:nvSpPr>
+          <p:cNvPr id="5" name="PlaceHolder 4"/>
+          <p:cNvSpPr>
+            <a:spLocks noGrp="1"/>
+          </p:cNvSpPr>
+          <p:nvPr>
+            <p:ph type="dt" idx="12"/>
+          </p:nvPr>
+        </p:nvSpPr>
+        <p:spPr/>
+        <p:txBody>
+          <a:bodyPr/>
+          <a:p>
+            <a:fld id="{7D466345-D883-4AA5-BFF3-2ACF29F24024}" type="datetime1">
+              <a:rPr lang="en-US"/>
+              <a:t>03/26/2024</a:t>
+            </a:fld>
+          </a:p>
+        </p:txBody>
+      </p:sp>
+    </p:spTree>
+  </p:cSld>
+  <mc:AlternateContent>
+    <mc:Choice Requires="p14">
+      <p:transition spd="slow" p14:dur="2000"/>
+    </mc:Choice>
+    <mc:Fallback>
+      <p:transition spd="slow"/>
+    </mc:Fallback>
+  </mc:AlternateContent>
+</p:sld>
+</file>
+
+<file path=ppt/slides/slide12.xml><?xml version="1.0" encoding="utf-8"?>
+<p:sld xmlns:a="http://schemas.openxmlformats.org/drawingml/2006/main" xmlns:p="http://schemas.openxmlformats.org/presentationml/2006/main" xmlns:r="http://schemas.openxmlformats.org/officeDocument/2006/relationships" xmlns:p14="http://schemas.microsoft.com/office/powerpoint/2010/main" xmlns:p15="http://schemas.microsoft.com/office/powerpoint/2012/main" xmlns:mc="http://schemas.openxmlformats.org/markup-compatibility/2006">
+  <p:cSld>
+    <p:spTree>
+      <p:nvGrpSpPr>
+        <p:cNvPr id="1" name=""/>
+        <p:cNvGrpSpPr/>
+        <p:nvPr/>
+      </p:nvGrpSpPr>
+      <p:grpSpPr>
+        <a:xfrm>
+          <a:off x="0" y="0"/>
+          <a:ext cx="0" cy="0"/>
+          <a:chOff x="0" y="0"/>
+          <a:chExt cx="0" cy="0"/>
+        </a:xfrm>
+      </p:grpSpPr>
+      <p:sp>
+        <p:nvSpPr>
+          <p:cNvPr id="251" name="PlaceHolder 1"/>
+          <p:cNvSpPr>
+            <a:spLocks noGrp="1"/>
+          </p:cNvSpPr>
+          <p:nvPr>
+            <p:ph type="title"/>
+          </p:nvPr>
+        </p:nvSpPr>
+        <p:spPr>
+          <a:xfrm>
+            <a:off x="360000" y="106200"/>
+            <a:ext cx="9359280" cy="624960"/>
+          </a:xfrm>
+          <a:prstGeom prst="rect">
+            <a:avLst/>
+          </a:prstGeom>
+          <a:noFill/>
+          <a:ln w="0">
+            <a:noFill/>
+          </a:ln>
+        </p:spPr>
+        <p:txBody>
+          <a:bodyPr lIns="0" rIns="0" tIns="0" bIns="0" anchor="ctr">
+            <a:noAutofit/>
+          </a:bodyPr>
+          <a:p>
+            <a:pPr algn="ctr">
+              <a:lnSpc>
+                <a:spcPct val="100000"/>
+              </a:lnSpc>
+              <a:buNone/>
+            </a:pPr>
+            <a:r>
+              <a:rPr b="0" lang="en-US" sz="4400" spc="-1" strike="noStrike">
+                <a:latin typeface="Arial"/>
+              </a:rPr>
+              <a:t>LGBTQ+ Observations</a:t>
+            </a:r>
+            <a:endParaRPr b="0" lang="en-US" sz="4400" spc="-1" strike="noStrike">
+              <a:latin typeface="Arial"/>
+            </a:endParaRPr>
+          </a:p>
+        </p:txBody>
+      </p:sp>
+      <p:sp>
+        <p:nvSpPr>
+          <p:cNvPr id="252" name="PlaceHolder 2"/>
+          <p:cNvSpPr>
+            <a:spLocks noGrp="1"/>
+          </p:cNvSpPr>
+          <p:nvPr>
+            <p:ph/>
+          </p:nvPr>
+        </p:nvSpPr>
+        <p:spPr>
+          <a:xfrm>
+            <a:off x="360000" y="813240"/>
+            <a:ext cx="8784000" cy="685800"/>
+          </a:xfrm>
+          <a:prstGeom prst="rect">
+            <a:avLst/>
+          </a:prstGeom>
+          <a:noFill/>
+          <a:ln w="0">
+            <a:noFill/>
+          </a:ln>
+        </p:spPr>
+        <p:txBody>
+          <a:bodyPr lIns="0" rIns="0" tIns="0" bIns="0" anchor="t">
+            <a:normAutofit/>
+          </a:bodyPr>
+          <a:p>
+            <a:pPr marL="432000" indent="-324000">
+              <a:lnSpc>
+                <a:spcPct val="100000"/>
+              </a:lnSpc>
+              <a:spcBef>
+                <a:spcPts val="1417"/>
+              </a:spcBef>
+              <a:buClr>
+                <a:srgbClr val="000000"/>
+              </a:buClr>
+              <a:buSzPct val="45000"/>
+              <a:buFont typeface="Wingdings" charset="2"/>
+              <a:buChar char=""/>
+            </a:pPr>
+            <a:r>
+              <a:rPr b="0" lang="en-US" sz="1500" spc="-1" strike="noStrike">
+                <a:latin typeface="Arial"/>
+              </a:rPr>
+              <a:t> </a:t>
+            </a:r>
+            <a:r>
+              <a:rPr b="0" lang="en-US" sz="1500" spc="-1" strike="noStrike">
+                <a:latin typeface="Arial"/>
+              </a:rPr>
+              <a:t>Not sure of relevance of this graph – but with Haitian migration during 2022, not many LGBTQ+ parties</a:t>
+            </a:r>
+            <a:endParaRPr b="0" lang="en-US" sz="1500" spc="-1" strike="noStrike">
+              <a:latin typeface="Arial"/>
+            </a:endParaRPr>
+          </a:p>
+        </p:txBody>
+      </p:sp>
+      <p:pic>
+        <p:nvPicPr>
+          <p:cNvPr id="253" name="" descr=""/>
+          <p:cNvPicPr/>
+          <p:nvPr/>
+        </p:nvPicPr>
+        <p:blipFill>
+          <a:blip r:embed="rId1"/>
+          <a:stretch/>
+        </p:blipFill>
+        <p:spPr>
+          <a:xfrm>
+            <a:off x="0" y="1499040"/>
+            <a:ext cx="10080360" cy="3530160"/>
+          </a:xfrm>
+          <a:prstGeom prst="rect">
+            <a:avLst/>
+          </a:prstGeom>
+          <a:ln w="0">
+            <a:noFill/>
+          </a:ln>
+        </p:spPr>
+      </p:pic>
+      <p:sp>
+        <p:nvSpPr>
+          <p:cNvPr id="4" name="PlaceHolder 3"/>
+          <p:cNvSpPr>
+            <a:spLocks noGrp="1"/>
+          </p:cNvSpPr>
+          <p:nvPr>
+            <p:ph type="sldNum" idx="11"/>
+          </p:nvPr>
+        </p:nvSpPr>
+        <p:spPr/>
+        <p:txBody>
+          <a:bodyPr/>
+          <a:p>
+            <a:fld id="{DC95369B-4A1F-4700-9A47-ADB9AEFD22B7}" type="slidenum">
+              <a:t>12</a:t>
+            </a:fld>
+          </a:p>
+        </p:txBody>
+      </p:sp>
+      <p:sp>
+        <p:nvSpPr>
+          <p:cNvPr id="5" name="PlaceHolder 4"/>
+          <p:cNvSpPr>
+            <a:spLocks noGrp="1"/>
+          </p:cNvSpPr>
+          <p:nvPr>
+            <p:ph type="dt" idx="12"/>
+          </p:nvPr>
+        </p:nvSpPr>
+        <p:spPr/>
+        <p:txBody>
+          <a:bodyPr/>
+          <a:p>
+            <a:fld id="{3D79E4C3-5A27-43EF-98A5-D9F9892603B3}" type="datetime1">
+              <a:rPr lang="en-US"/>
+              <a:t>03/26/2024</a:t>
+            </a:fld>
+          </a:p>
+        </p:txBody>
+      </p:sp>
+    </p:spTree>
+  </p:cSld>
+  <mc:AlternateContent>
+    <mc:Choice Requires="p14">
+      <p:transition spd="slow" p14:dur="2000"/>
+    </mc:Choice>
+    <mc:Fallback>
+      <p:transition spd="slow"/>
+    </mc:Fallback>
+  </mc:AlternateContent>
+</p:sld>
+</file>
+
+<file path=ppt/slides/slide13.xml><?xml version="1.0" encoding="utf-8"?>
+<p:sld xmlns:a="http://schemas.openxmlformats.org/drawingml/2006/main" xmlns:p="http://schemas.openxmlformats.org/presentationml/2006/main" xmlns:r="http://schemas.openxmlformats.org/officeDocument/2006/relationships" xmlns:p14="http://schemas.microsoft.com/office/powerpoint/2010/main" xmlns:p15="http://schemas.microsoft.com/office/powerpoint/2012/main" xmlns:mc="http://schemas.openxmlformats.org/markup-compatibility/2006">
+  <p:cSld>
+    <p:spTree>
+      <p:nvGrpSpPr>
+        <p:cNvPr id="1" name=""/>
+        <p:cNvGrpSpPr/>
+        <p:nvPr/>
+      </p:nvGrpSpPr>
+      <p:grpSpPr>
+        <a:xfrm>
+          <a:off x="0" y="0"/>
+          <a:ext cx="0" cy="0"/>
+          <a:chOff x="0" y="0"/>
+          <a:chExt cx="0" cy="0"/>
+        </a:xfrm>
+      </p:grpSpPr>
+      <p:sp>
+        <p:nvSpPr>
+          <p:cNvPr id="254" name="PlaceHolder 1"/>
+          <p:cNvSpPr>
+            <a:spLocks noGrp="1"/>
+          </p:cNvSpPr>
+          <p:nvPr>
+            <p:ph type="title"/>
+          </p:nvPr>
+        </p:nvSpPr>
+        <p:spPr>
+          <a:xfrm>
+            <a:off x="360000" y="106200"/>
+            <a:ext cx="9359280" cy="624960"/>
+          </a:xfrm>
+          <a:prstGeom prst="rect">
+            <a:avLst/>
+          </a:prstGeom>
+          <a:noFill/>
+          <a:ln w="0">
+            <a:noFill/>
+          </a:ln>
+        </p:spPr>
+        <p:txBody>
+          <a:bodyPr lIns="0" rIns="0" tIns="0" bIns="0" anchor="ctr">
+            <a:noAutofit/>
+          </a:bodyPr>
+          <a:p>
+            <a:pPr algn="ctr">
+              <a:lnSpc>
+                <a:spcPct val="100000"/>
+              </a:lnSpc>
+              <a:buNone/>
+            </a:pPr>
+            <a:r>
+              <a:rPr b="0" lang="en-US" sz="4400" spc="-1" strike="noStrike">
+                <a:latin typeface="Arial"/>
+              </a:rPr>
+              <a:t>LGBTQ+ Observations</a:t>
+            </a:r>
+            <a:endParaRPr b="0" lang="en-US" sz="4400" spc="-1" strike="noStrike">
+              <a:latin typeface="Arial"/>
+            </a:endParaRPr>
+          </a:p>
+        </p:txBody>
+      </p:sp>
+      <p:sp>
+        <p:nvSpPr>
+          <p:cNvPr id="255" name="PlaceHolder 2"/>
+          <p:cNvSpPr>
+            <a:spLocks noGrp="1"/>
+          </p:cNvSpPr>
+          <p:nvPr>
+            <p:ph/>
+          </p:nvPr>
+        </p:nvSpPr>
+        <p:spPr>
+          <a:xfrm>
+            <a:off x="360000" y="813240"/>
+            <a:ext cx="8784000" cy="685800"/>
+          </a:xfrm>
+          <a:prstGeom prst="rect">
+            <a:avLst/>
+          </a:prstGeom>
+          <a:noFill/>
+          <a:ln w="0">
+            <a:noFill/>
+          </a:ln>
+        </p:spPr>
+        <p:txBody>
+          <a:bodyPr lIns="0" rIns="0" tIns="0" bIns="0" anchor="t">
+            <a:normAutofit/>
+          </a:bodyPr>
+          <a:p>
+            <a:pPr marL="432000" indent="-324000">
+              <a:lnSpc>
+                <a:spcPct val="100000"/>
+              </a:lnSpc>
+              <a:spcBef>
+                <a:spcPts val="1417"/>
+              </a:spcBef>
+              <a:buClr>
+                <a:srgbClr val="000000"/>
+              </a:buClr>
+              <a:buSzPct val="45000"/>
+              <a:buFont typeface="Wingdings" charset="2"/>
+              <a:buChar char=""/>
+            </a:pPr>
+            <a:r>
+              <a:rPr b="0" lang="en-US" sz="1500" spc="-1" strike="noStrike">
+                <a:latin typeface="Arial"/>
+              </a:rPr>
+              <a:t> </a:t>
+            </a:r>
+            <a:r>
+              <a:rPr b="0" lang="en-US" sz="1500" spc="-1" strike="noStrike">
+                <a:latin typeface="Arial"/>
+              </a:rPr>
+              <a:t>Not sure of relevance of this graph – but with Haitian migration during 2022, not many LGBTQ+ parties</a:t>
+            </a:r>
+            <a:endParaRPr b="0" lang="en-US" sz="1500" spc="-1" strike="noStrike">
+              <a:latin typeface="Arial"/>
+            </a:endParaRPr>
+          </a:p>
+        </p:txBody>
+      </p:sp>
+      <p:pic>
+        <p:nvPicPr>
+          <p:cNvPr id="256" name="" descr=""/>
+          <p:cNvPicPr/>
+          <p:nvPr/>
+        </p:nvPicPr>
+        <p:blipFill>
+          <a:blip r:embed="rId1"/>
+          <a:stretch/>
+        </p:blipFill>
+        <p:spPr>
+          <a:xfrm>
+            <a:off x="0" y="1499040"/>
+            <a:ext cx="10080360" cy="3530160"/>
+          </a:xfrm>
+          <a:prstGeom prst="rect">
+            <a:avLst/>
+          </a:prstGeom>
+          <a:ln w="0">
+            <a:noFill/>
+          </a:ln>
+        </p:spPr>
+      </p:pic>
+      <p:sp>
+        <p:nvSpPr>
+          <p:cNvPr id="4" name="PlaceHolder 3"/>
+          <p:cNvSpPr>
+            <a:spLocks noGrp="1"/>
+          </p:cNvSpPr>
+          <p:nvPr>
+            <p:ph type="sldNum" idx="11"/>
+          </p:nvPr>
+        </p:nvSpPr>
+        <p:spPr/>
+        <p:txBody>
+          <a:bodyPr/>
+          <a:p>
+            <a:fld id="{581123E3-7D81-4CFE-8871-C67B2334FDC1}" type="slidenum">
+              <a:t>13</a:t>
+            </a:fld>
+          </a:p>
+        </p:txBody>
+      </p:sp>
+      <p:sp>
+        <p:nvSpPr>
+          <p:cNvPr id="5" name="PlaceHolder 4"/>
+          <p:cNvSpPr>
+            <a:spLocks noGrp="1"/>
+          </p:cNvSpPr>
+          <p:nvPr>
+            <p:ph type="dt" idx="12"/>
+          </p:nvPr>
+        </p:nvSpPr>
+        <p:spPr/>
+        <p:txBody>
+          <a:bodyPr/>
+          <a:p>
+            <a:fld id="{1ABCA671-E665-4E40-BE9C-2C331327A1EA}" type="datetime1">
+              <a:rPr lang="en-US"/>
+              <a:t>03/26/2024</a:t>
+            </a:fld>
+          </a:p>
+        </p:txBody>
+      </p:sp>
+    </p:spTree>
+  </p:cSld>
+  <mc:AlternateContent>
+    <mc:Choice Requires="p14">
+      <p:transition spd="slow" p14:dur="2000"/>
+    </mc:Choice>
+    <mc:Fallback>
+      <p:transition spd="slow"/>
+    </mc:Fallback>
+  </mc:AlternateContent>
+</p:sld>
+</file>
+
 <file path=ppt/slides/slide2.xml><?xml version="1.0" encoding="utf-8"?>
 <p:sld xmlns:a="http://schemas.openxmlformats.org/drawingml/2006/main" xmlns:p="http://schemas.openxmlformats.org/presentationml/2006/main" xmlns:r="http://schemas.openxmlformats.org/officeDocument/2006/relationships" xmlns:p14="http://schemas.microsoft.com/office/powerpoint/2010/main" xmlns:p15="http://schemas.microsoft.com/office/powerpoint/2012/main" xmlns:mc="http://schemas.openxmlformats.org/markup-compatibility/2006">
   <p:cSld>
@@ -14363,7 +15379,7 @@
         <p:spPr>
           <a:xfrm>
             <a:off x="360000" y="1080000"/>
-            <a:ext cx="4566960" cy="3599280"/>
+            <a:ext cx="2611800" cy="3599280"/>
           </a:xfrm>
           <a:prstGeom prst="rect">
             <a:avLst/>
@@ -14375,7 +15391,7 @@
         </p:spPr>
         <p:txBody>
           <a:bodyPr lIns="0" rIns="0" tIns="0" bIns="0" anchor="t">
-            <a:normAutofit fontScale="93000"/>
+            <a:normAutofit fontScale="84000"/>
           </a:bodyPr>
           <a:p>
             <a:pPr marL="432000" indent="-324000">
@@ -14396,7 +15412,7 @@
               <a:rPr b="0" lang="en-US" sz="2000" spc="-1" strike="noStrike">
                 <a:latin typeface="Arial"/>
               </a:rPr>
-              <a:t>LA helped a lot of people in 2021-2023</a:t>
+              <a:t>LA helped a lot of people in 2021-2023!</a:t>
             </a:r>
             <a:endParaRPr b="0" lang="en-US" sz="2000" spc="-1" strike="noStrike">
               <a:latin typeface="Arial"/>
@@ -14452,13 +15468,13 @@
               <a:rPr b="1" lang="en-US" sz="2000" spc="-1" strike="noStrike">
                 <a:latin typeface="Arial"/>
               </a:rPr>
-              <a:t>72% of parties</a:t>
+              <a:t>945 </a:t>
             </a:r>
             <a:r>
               <a:rPr b="0" lang="en-US" sz="2000" spc="-1" strike="noStrike">
                 <a:latin typeface="Arial"/>
               </a:rPr>
-              <a:t> are not single (aka  a family unit)</a:t>
+              <a:t>People per month</a:t>
             </a:r>
             <a:endParaRPr b="0" lang="en-US" sz="2000" spc="-1" strike="noStrike">
               <a:latin typeface="Arial"/>
@@ -14479,50 +15495,7 @@
               <a:buFont typeface="Symbol"/>
               <a:buChar char=""/>
             </a:pPr>
-            <a:r>
-              <a:rPr b="0" lang="en-US" sz="2000" spc="-1" strike="noStrike">
-                <a:latin typeface="Arial"/>
-              </a:rPr>
-              <a:t>Average Party Size:</a:t>
-            </a:r>
-            <a:r>
-              <a:rPr b="1" lang="en-US" sz="2000" spc="-1" strike="noStrike">
-                <a:latin typeface="Arial"/>
-              </a:rPr>
-              <a:t> 2.9</a:t>
-            </a:r>
-            <a:r>
-              <a:rPr b="0" lang="en-US" sz="2000" spc="-1" strike="noStrike">
-                <a:latin typeface="Arial"/>
-              </a:rPr>
-              <a:t> people per party. </a:t>
-            </a:r>
             <a:endParaRPr b="0" lang="en-US" sz="2000" spc="-1" strike="noStrike">
-              <a:latin typeface="Arial"/>
-            </a:endParaRPr>
-          </a:p>
-          <a:p>
-            <a:pPr lvl="2" marL="1296000" indent="-288000">
-              <a:lnSpc>
-                <a:spcPct val="100000"/>
-              </a:lnSpc>
-              <a:spcBef>
-                <a:spcPts val="850"/>
-              </a:spcBef>
-              <a:buClr>
-                <a:srgbClr val="000000"/>
-              </a:buClr>
-              <a:buSzPct val="45000"/>
-              <a:buFont typeface="Wingdings" charset="2"/>
-              <a:buChar char=""/>
-            </a:pPr>
-            <a:r>
-              <a:rPr b="0" lang="en-US" sz="1000" spc="-1" strike="noStrike">
-                <a:latin typeface="Arial"/>
-              </a:rPr>
-              <a:t>Counter rhetoric that majority are single males coming to overthrow govt </a:t>
-            </a:r>
-            <a:endParaRPr b="0" lang="en-US" sz="1000" spc="-1" strike="noStrike">
               <a:latin typeface="Arial"/>
             </a:endParaRPr>
           </a:p>
@@ -14532,9 +15505,28 @@
                 <a:spcPct val="100000"/>
               </a:lnSpc>
               <a:spcBef>
-                <a:spcPts val="1417"/>
+                <a:spcPts val="1134"/>
               </a:spcBef>
               <a:buNone/>
+            </a:pPr>
+            <a:endParaRPr b="0" lang="en-US" sz="2800" spc="-1" strike="noStrike">
+              <a:latin typeface="Arial"/>
+            </a:endParaRPr>
+          </a:p>
+          <a:p>
+            <a:pPr lvl="1" marL="864000" indent="-324000">
+              <a:lnSpc>
+                <a:spcPct val="100000"/>
+              </a:lnSpc>
+              <a:spcBef>
+                <a:spcPts val="1134"/>
+              </a:spcBef>
+              <a:buClr>
+                <a:srgbClr val="000000"/>
+              </a:buClr>
+              <a:buSzPct val="75000"/>
+              <a:buFont typeface="Symbol"/>
+              <a:buChar char=""/>
             </a:pPr>
             <a:endParaRPr b="0" lang="en-US" sz="2000" spc="-1" strike="noStrike">
               <a:latin typeface="Arial"/>
@@ -14579,8 +15571,8 @@
         </p:blipFill>
         <p:spPr>
           <a:xfrm>
-            <a:off x="4995360" y="846720"/>
-            <a:ext cx="5519880" cy="3953520"/>
+            <a:off x="2778480" y="731160"/>
+            <a:ext cx="7305480" cy="3840840"/>
           </a:xfrm>
           <a:prstGeom prst="rect">
             <a:avLst/>
@@ -14604,7 +15596,7 @@
         <p:txBody>
           <a:bodyPr/>
           <a:p>
-            <a:fld id="{92445E1C-AAB0-44A8-A072-B4BE9D3A5DF4}" type="slidenum">
+            <a:fld id="{23402050-7240-469A-B4B2-2999BC7FCD3A}" type="slidenum">
               <a:t>2</a:t>
             </a:fld>
           </a:p>
@@ -14624,7 +15616,7 @@
         <p:txBody>
           <a:bodyPr/>
           <a:p>
-            <a:fld id="{BECEF933-CE7D-469C-A106-14095E4F8016}" type="datetime1">
+            <a:fld id="{9F5832B2-3F73-4B43-9DAE-5ECCAFF82A59}" type="datetime1">
               <a:rPr lang="en-US"/>
               <a:t>03/26/2024</a:t>
             </a:fld>
@@ -14736,6 +15728,9 @@
           </a:bodyPr>
           <a:p>
             <a:pPr marL="432000" indent="-324000">
+              <a:lnSpc>
+                <a:spcPct val="100000"/>
+              </a:lnSpc>
               <a:spcBef>
                 <a:spcPts val="1417"/>
               </a:spcBef>
@@ -14746,11 +15741,131 @@
               <a:buFont typeface="Wingdings" charset="2"/>
               <a:buChar char=""/>
             </a:pPr>
+            <a:endParaRPr b="0" lang="en-US" sz="2000" spc="-1" strike="noStrike">
+              <a:latin typeface="Arial"/>
+            </a:endParaRPr>
+          </a:p>
+          <a:p>
+            <a:pPr lvl="1" marL="864000" indent="-324000">
+              <a:lnSpc>
+                <a:spcPct val="100000"/>
+              </a:lnSpc>
+              <a:spcBef>
+                <a:spcPts val="1134"/>
+              </a:spcBef>
+              <a:buClr>
+                <a:srgbClr val="000000"/>
+              </a:buClr>
+              <a:buSzPct val="75000"/>
+              <a:buFont typeface="Symbol"/>
+              <a:buChar char=""/>
+            </a:pPr>
+            <a:r>
+              <a:rPr b="1" lang="en-US" sz="2000" spc="-1" strike="noStrike">
+                <a:latin typeface="Arial"/>
+              </a:rPr>
+              <a:t>72% of parties</a:t>
+            </a:r>
+            <a:r>
+              <a:rPr b="0" lang="en-US" sz="2000" spc="-1" strike="noStrike">
+                <a:latin typeface="Arial"/>
+              </a:rPr>
+              <a:t> are not single (aka are a family unit)</a:t>
+            </a:r>
+            <a:endParaRPr b="0" lang="en-US" sz="2000" spc="-1" strike="noStrike">
+              <a:latin typeface="Arial"/>
+            </a:endParaRPr>
+          </a:p>
+          <a:p>
+            <a:pPr lvl="1" marL="864000" indent="-324000">
+              <a:lnSpc>
+                <a:spcPct val="100000"/>
+              </a:lnSpc>
+              <a:spcBef>
+                <a:spcPts val="1134"/>
+              </a:spcBef>
+              <a:buClr>
+                <a:srgbClr val="000000"/>
+              </a:buClr>
+              <a:buSzPct val="75000"/>
+              <a:buFont typeface="Symbol"/>
+              <a:buChar char=""/>
+            </a:pPr>
+            <a:r>
+              <a:rPr b="0" lang="en-US" sz="2000" spc="-1" strike="noStrike">
+                <a:latin typeface="Arial"/>
+              </a:rPr>
+              <a:t>Average Party Size:</a:t>
+            </a:r>
+            <a:r>
+              <a:rPr b="1" lang="en-US" sz="2000" spc="-1" strike="noStrike">
+                <a:latin typeface="Arial"/>
+              </a:rPr>
+              <a:t> 2.9</a:t>
+            </a:r>
+            <a:r>
+              <a:rPr b="0" lang="en-US" sz="2000" spc="-1" strike="noStrike">
+                <a:latin typeface="Arial"/>
+              </a:rPr>
+              <a:t> people per party. </a:t>
+            </a:r>
+            <a:endParaRPr b="0" lang="en-US" sz="2000" spc="-1" strike="noStrike">
+              <a:latin typeface="Arial"/>
+            </a:endParaRPr>
+          </a:p>
+          <a:p>
+            <a:pPr lvl="2" marL="1296000" indent="-288000">
+              <a:lnSpc>
+                <a:spcPct val="100000"/>
+              </a:lnSpc>
+              <a:spcBef>
+                <a:spcPts val="850"/>
+              </a:spcBef>
+              <a:buClr>
+                <a:srgbClr val="000000"/>
+              </a:buClr>
+              <a:buSzPct val="45000"/>
+              <a:buFont typeface="Wingdings" charset="2"/>
+              <a:buChar char=""/>
+            </a:pPr>
+            <a:endParaRPr b="0" lang="en-US" sz="1000" spc="-1" strike="noStrike">
+              <a:latin typeface="Arial"/>
+            </a:endParaRPr>
+          </a:p>
+          <a:p>
+            <a:pPr>
+              <a:lnSpc>
+                <a:spcPct val="100000"/>
+              </a:lnSpc>
+              <a:spcBef>
+                <a:spcPts val="1417"/>
+              </a:spcBef>
+              <a:buNone/>
+            </a:pPr>
+            <a:endParaRPr b="0" lang="en-US" sz="2000" spc="-1" strike="noStrike">
+              <a:latin typeface="Arial"/>
+            </a:endParaRPr>
+          </a:p>
+          <a:p>
+            <a:pPr marL="432000" indent="-324000">
+              <a:lnSpc>
+                <a:spcPct val="100000"/>
+              </a:lnSpc>
+              <a:spcBef>
+                <a:spcPts val="1417"/>
+              </a:spcBef>
+              <a:buClr>
+                <a:srgbClr val="000000"/>
+              </a:buClr>
+              <a:buSzPct val="45000"/>
+              <a:buFont typeface="Wingdings" charset="2"/>
+              <a:buChar char=""/>
+            </a:pPr>
             <a:r>
               <a:rPr b="0" lang="en-US" sz="3200" spc="-1" strike="noStrike">
                 <a:latin typeface="Arial"/>
               </a:rPr>
-              <a:t>Have worked with very diverse groups of countries each with their own challenges and cultures… </a:t>
+              <a:t> </a:t>
             </a:r>
             <a:endParaRPr b="0" lang="en-US" sz="3200" spc="-1" strike="noStrike">
               <a:latin typeface="Arial"/>
@@ -14770,8 +15885,8 @@
         </p:blipFill>
         <p:spPr>
           <a:xfrm>
-            <a:off x="5048640" y="790920"/>
-            <a:ext cx="5031720" cy="3780720"/>
+            <a:off x="4995360" y="846720"/>
+            <a:ext cx="5519880" cy="3953520"/>
           </a:xfrm>
           <a:prstGeom prst="rect">
             <a:avLst/>
@@ -14795,7 +15910,7 @@
         <p:txBody>
           <a:bodyPr/>
           <a:p>
-            <a:fld id="{C9544DA1-5B26-48E3-9216-7463A0A7E6D7}" type="slidenum">
+            <a:fld id="{38726D5F-803A-4452-96CB-FB334BA53C59}" type="slidenum">
               <a:t>3</a:t>
             </a:fld>
           </a:p>
@@ -14815,7 +15930,7 @@
         <p:txBody>
           <a:bodyPr/>
           <a:p>
-            <a:fld id="{C4B8398C-8B05-4967-A4D8-341A01198EFF}" type="datetime1">
+            <a:fld id="{BBB492FF-D1CE-4B2B-937F-6AB6C9B763DF}" type="datetime1">
               <a:rPr lang="en-US"/>
               <a:t>03/26/2024</a:t>
             </a:fld>
@@ -14911,7 +16026,7 @@
         <p:spPr>
           <a:xfrm>
             <a:off x="360000" y="1080000"/>
-            <a:ext cx="3068640" cy="3599280"/>
+            <a:ext cx="4566960" cy="3599280"/>
           </a:xfrm>
           <a:prstGeom prst="rect">
             <a:avLst/>
@@ -14923,13 +16038,10 @@
         </p:spPr>
         <p:txBody>
           <a:bodyPr lIns="0" rIns="0" tIns="0" bIns="0" anchor="t">
-            <a:normAutofit fontScale="93000"/>
+            <a:normAutofit/>
           </a:bodyPr>
           <a:p>
             <a:pPr marL="432000" indent="-324000">
-              <a:lnSpc>
-                <a:spcPct val="100000"/>
-              </a:lnSpc>
               <a:spcBef>
                 <a:spcPts val="1417"/>
               </a:spcBef>
@@ -14941,43 +16053,24 @@
               <a:buChar char=""/>
             </a:pPr>
             <a:r>
-              <a:rPr b="0" lang="en-US" sz="1820" spc="-1" strike="noStrike">
-                <a:latin typeface="Arial"/>
-              </a:rPr>
-              <a:t>Over time we saw a lot changes – particular patterns of where people came from means we dealt with people differently </a:t>
-            </a:r>
-            <a:endParaRPr b="0" lang="en-US" sz="1820" spc="-1" strike="noStrike">
-              <a:latin typeface="Arial"/>
-            </a:endParaRPr>
-          </a:p>
-          <a:p>
-            <a:pPr lvl="1" marL="864000" indent="-324000">
-              <a:lnSpc>
-                <a:spcPct val="100000"/>
-              </a:lnSpc>
-              <a:spcBef>
-                <a:spcPts val="1134"/>
-              </a:spcBef>
-              <a:buClr>
-                <a:srgbClr val="000000"/>
-              </a:buClr>
-              <a:buSzPct val="75000"/>
-              <a:buFont typeface="Symbol"/>
-              <a:buChar char=""/>
-            </a:pPr>
-            <a:r>
-              <a:rPr b="0" lang="en-US" sz="1820" spc="-1" strike="noStrike">
-                <a:latin typeface="Arial"/>
-              </a:rPr>
-              <a:t>– </a:t>
-            </a:r>
-            <a:r>
-              <a:rPr b="0" lang="en-US" sz="1820" spc="-1" strike="noStrike">
-                <a:latin typeface="Arial"/>
-              </a:rPr>
-              <a:t>explain challenges of Haitians (don’t speak spanish, traveled a lot, faced racism) and Venezuelans (didn’t have prior family in USA...) particular other ethnic groups/countries </a:t>
-            </a:r>
-            <a:endParaRPr b="0" lang="en-US" sz="1820" spc="-1" strike="noStrike">
+              <a:rPr b="0" lang="en-US" sz="3200" spc="-1" strike="noStrike">
+                <a:latin typeface="Arial"/>
+              </a:rPr>
+              <a:t>Have worked with very diverse groups of </a:t>
+            </a:r>
+            <a:r>
+              <a:rPr b="0" lang="en-US" sz="3200" spc="-1" strike="noStrike">
+                <a:latin typeface="Arial"/>
+              </a:rPr>
+              <a:t>countries each with their own challenges and </a:t>
+            </a:r>
+            <a:r>
+              <a:rPr b="0" lang="en-US" sz="3200" spc="-1" strike="noStrike">
+                <a:latin typeface="Arial"/>
+              </a:rPr>
+              <a:t>cultures… </a:t>
+            </a:r>
+            <a:endParaRPr b="0" lang="en-US" sz="3200" spc="-1" strike="noStrike">
               <a:latin typeface="Arial"/>
             </a:endParaRPr>
           </a:p>
@@ -14995,8 +16088,8 @@
         </p:blipFill>
         <p:spPr>
           <a:xfrm>
-            <a:off x="3657600" y="730440"/>
-            <a:ext cx="6429240" cy="4069800"/>
+            <a:off x="5048640" y="790920"/>
+            <a:ext cx="5031720" cy="3780720"/>
           </a:xfrm>
           <a:prstGeom prst="rect">
             <a:avLst/>
@@ -15020,7 +16113,7 @@
         <p:txBody>
           <a:bodyPr/>
           <a:p>
-            <a:fld id="{42C37821-3AF7-4581-BB6D-3529D54C5FF1}" type="slidenum">
+            <a:fld id="{76AFDAE0-9AA4-4E4C-AB41-7AA064DF51E5}" type="slidenum">
               <a:t>4</a:t>
             </a:fld>
           </a:p>
@@ -15040,7 +16133,7 @@
         <p:txBody>
           <a:bodyPr/>
           <a:p>
-            <a:fld id="{8CDECEFE-700E-40A3-B9DB-81A217B51BC2}" type="datetime1">
+            <a:fld id="{2FEF5C48-B7D5-4DEB-A3C1-EB30FB467EDA}" type="datetime1">
               <a:rPr lang="en-US"/>
               <a:t>03/26/2024</a:t>
             </a:fld>
@@ -15089,8 +16182,8 @@
         </p:nvSpPr>
         <p:spPr>
           <a:xfrm>
-            <a:off x="360000" y="180000"/>
-            <a:ext cx="9359280" cy="477360"/>
+            <a:off x="360000" y="106200"/>
+            <a:ext cx="9359280" cy="624960"/>
           </a:xfrm>
           <a:prstGeom prst="rect">
             <a:avLst/>
@@ -15112,15 +16205,12 @@
               <a:buNone/>
             </a:pPr>
             <a:r>
-              <a:rPr b="0" lang="en-US" sz="3300" spc="-1" strike="noStrike">
-                <a:solidFill>
-                  <a:srgbClr val="ffffff"/>
-                </a:solidFill>
-                <a:latin typeface="Arial"/>
-              </a:rPr>
-              <a:t>T42 Data Conclusions</a:t>
-            </a:r>
-            <a:endParaRPr b="0" lang="en-US" sz="3300" spc="-1" strike="noStrike">
+              <a:rPr b="0" lang="en-US" sz="4400" spc="-1" strike="noStrike">
+                <a:latin typeface="Arial"/>
+              </a:rPr>
+              <a:t>Summary</a:t>
+            </a:r>
+            <a:endParaRPr b="0" lang="en-US" sz="4400" spc="-1" strike="noStrike">
               <a:latin typeface="Arial"/>
             </a:endParaRPr>
           </a:p>
@@ -15139,7 +16229,7 @@
         <p:spPr>
           <a:xfrm>
             <a:off x="360000" y="1080000"/>
-            <a:ext cx="9359280" cy="3599280"/>
+            <a:ext cx="3068640" cy="3599280"/>
           </a:xfrm>
           <a:prstGeom prst="rect">
             <a:avLst/>
@@ -15151,7 +16241,7 @@
         </p:spPr>
         <p:txBody>
           <a:bodyPr lIns="0" rIns="0" tIns="0" bIns="0" anchor="t">
-            <a:noAutofit/>
+            <a:normAutofit fontScale="93000"/>
           </a:bodyPr>
           <a:p>
             <a:pPr marL="432000" indent="-324000">
@@ -15159,34 +16249,22 @@
                 <a:spcPct val="100000"/>
               </a:lnSpc>
               <a:spcBef>
-                <a:spcPts val="1060"/>
+                <a:spcPts val="1417"/>
               </a:spcBef>
               <a:buClr>
-                <a:srgbClr val="77caee"/>
+                <a:srgbClr val="000000"/>
               </a:buClr>
               <a:buSzPct val="45000"/>
               <a:buFont typeface="Wingdings" charset="2"/>
               <a:buChar char=""/>
             </a:pPr>
             <a:r>
-              <a:rPr b="0" lang="en-US" sz="2400" spc="-1" strike="noStrike">
-                <a:solidFill>
-                  <a:srgbClr val="009bdd"/>
-                </a:solidFill>
-                <a:latin typeface="Arial"/>
-              </a:rPr>
-              <a:t>Average Number of Days traveling through Mexico – 77 Days      </a:t>
-            </a:r>
-            <a:r>
-              <a:rPr b="0" lang="en-US" sz="1000" spc="-1" strike="noStrike">
-                <a:solidFill>
-                  <a:srgbClr val="009bdd"/>
-                </a:solidFill>
-                <a:latin typeface="Arial"/>
-              </a:rPr>
-              <a:t>(T42 Screening Data Airtables)</a:t>
-            </a:r>
-            <a:endParaRPr b="0" lang="en-US" sz="1000" spc="-1" strike="noStrike">
+              <a:rPr b="0" lang="en-US" sz="1820" spc="-1" strike="noStrike">
+                <a:latin typeface="Arial"/>
+              </a:rPr>
+              <a:t>Over time we saw a lot changes – particular patterns of where people came from means we dealt with people differently </a:t>
+            </a:r>
+            <a:endParaRPr b="0" lang="en-US" sz="1820" spc="-1" strike="noStrike">
               <a:latin typeface="Arial"/>
             </a:endParaRPr>
           </a:p>
@@ -15206,74 +16284,18 @@
               <a:buChar char=""/>
             </a:pPr>
             <a:r>
-              <a:rPr b="0" lang="en-US" sz="1500" spc="-1" strike="noStrike">
-                <a:solidFill>
-                  <a:srgbClr val="009bdd"/>
-                </a:solidFill>
-                <a:latin typeface="Arial"/>
-              </a:rPr>
-              <a:t>“</a:t>
-            </a:r>
-            <a:r>
-              <a:rPr b="0" lang="en-US" sz="1500" spc="-1" strike="noStrike">
-                <a:solidFill>
-                  <a:srgbClr val="009bdd"/>
-                </a:solidFill>
-                <a:latin typeface="Arial"/>
-              </a:rPr>
-              <a:t>Mexico is dangerous for migrants - </a:t>
-            </a:r>
-            <a:r>
-              <a:rPr b="1" lang="en-US" sz="1500" spc="-1" strike="noStrike">
-                <a:solidFill>
-                  <a:srgbClr val="009bdd"/>
-                </a:solidFill>
-                <a:latin typeface="Arial"/>
-              </a:rPr>
-              <a:t>72%</a:t>
-            </a:r>
-            <a:r>
-              <a:rPr b="0" lang="en-US" sz="1500" spc="-1" strike="noStrike">
-                <a:solidFill>
-                  <a:srgbClr val="009bdd"/>
-                </a:solidFill>
-                <a:latin typeface="Arial"/>
-              </a:rPr>
-              <a:t> </a:t>
-            </a:r>
-            <a:r>
-              <a:rPr b="0" lang="en-US" sz="1000" spc="-1" strike="noStrike">
-                <a:solidFill>
-                  <a:srgbClr val="009bdd"/>
-                </a:solidFill>
-                <a:latin typeface="Arial"/>
-              </a:rPr>
-              <a:t>(LAMX Front Desk Data)</a:t>
-            </a:r>
-            <a:r>
-              <a:rPr b="0" lang="en-US" sz="1500" spc="-1" strike="noStrike">
-                <a:solidFill>
-                  <a:srgbClr val="009bdd"/>
-                </a:solidFill>
-                <a:latin typeface="Arial"/>
-              </a:rPr>
-              <a:t> report suffering some form of violence (kidnapping, robbing, death threats…) forcing them to stay there during T42 was danger to human rights.</a:t>
-            </a:r>
-            <a:endParaRPr b="0" lang="en-US" sz="1500" spc="-1" strike="noStrike">
-              <a:latin typeface="Arial"/>
-            </a:endParaRPr>
-          </a:p>
-          <a:p>
-            <a:pPr>
-              <a:lnSpc>
-                <a:spcPct val="100000"/>
-              </a:lnSpc>
-              <a:spcBef>
-                <a:spcPts val="1417"/>
-              </a:spcBef>
-              <a:buNone/>
-            </a:pPr>
-            <a:endParaRPr b="0" lang="en-US" sz="2800" spc="-1" strike="noStrike">
+              <a:rPr b="0" lang="en-US" sz="1820" spc="-1" strike="noStrike">
+                <a:latin typeface="Arial"/>
+              </a:rPr>
+              <a:t>– </a:t>
+            </a:r>
+            <a:r>
+              <a:rPr b="0" lang="en-US" sz="1820" spc="-1" strike="noStrike">
+                <a:latin typeface="Arial"/>
+              </a:rPr>
+              <a:t>explain challenges of Haitians (don’t speak spanish, traveled a lot, faced racism) and Venezuelans (didn’t have prior family in USA...) particular other ethnic groups/countries </a:t>
+            </a:r>
+            <a:endParaRPr b="0" lang="en-US" sz="1820" spc="-1" strike="noStrike">
               <a:latin typeface="Arial"/>
             </a:endParaRPr>
           </a:p>
@@ -15291,8 +16313,8 @@
         </p:blipFill>
         <p:spPr>
           <a:xfrm>
-            <a:off x="2117880" y="2286000"/>
-            <a:ext cx="4511160" cy="2742840"/>
+            <a:off x="3657600" y="730440"/>
+            <a:ext cx="6429240" cy="4069800"/>
           </a:xfrm>
           <a:prstGeom prst="rect">
             <a:avLst/>
@@ -15309,14 +16331,14 @@
             <a:spLocks noGrp="1"/>
           </p:cNvSpPr>
           <p:nvPr>
-            <p:ph type="sldNum" idx="5"/>
+            <p:ph type="sldNum" idx="2"/>
           </p:nvPr>
         </p:nvSpPr>
         <p:spPr/>
         <p:txBody>
           <a:bodyPr/>
           <a:p>
-            <a:fld id="{AF77023F-4CD6-4F77-99AB-1CF0F4F5CFA0}" type="slidenum">
+            <a:fld id="{A5BA49F0-7910-40EA-86B1-2D150B41DC29}" type="slidenum">
               <a:t>5</a:t>
             </a:fld>
           </a:p>
@@ -15329,14 +16351,14 @@
             <a:spLocks noGrp="1"/>
           </p:cNvSpPr>
           <p:nvPr>
-            <p:ph type="dt" idx="6"/>
+            <p:ph type="dt" idx="3"/>
           </p:nvPr>
         </p:nvSpPr>
         <p:spPr/>
         <p:txBody>
           <a:bodyPr/>
           <a:p>
-            <a:fld id="{BE1886B5-9198-4BA0-B759-40BEBAA9FC5A}" type="datetime1">
+            <a:fld id="{A50AF899-2E76-4F31-84FA-0E7C213ED48D}" type="datetime1">
               <a:rPr lang="en-US"/>
               <a:t>03/26/2024</a:t>
             </a:fld>
@@ -15385,8 +16407,8 @@
         </p:nvSpPr>
         <p:spPr>
           <a:xfrm>
-            <a:off x="360000" y="106200"/>
-            <a:ext cx="9359280" cy="624960"/>
+            <a:off x="360000" y="180000"/>
+            <a:ext cx="9359280" cy="477360"/>
           </a:xfrm>
           <a:prstGeom prst="rect">
             <a:avLst/>
@@ -15408,12 +16430,15 @@
               <a:buNone/>
             </a:pPr>
             <a:r>
-              <a:rPr b="0" lang="en-US" sz="4400" spc="-1" strike="noStrike">
-                <a:latin typeface="Arial"/>
-              </a:rPr>
-              <a:t>T42 CBP Wait Time</a:t>
-            </a:r>
-            <a:endParaRPr b="0" lang="en-US" sz="4400" spc="-1" strike="noStrike">
+              <a:rPr b="0" lang="en-US" sz="3300" spc="-1" strike="noStrike">
+                <a:solidFill>
+                  <a:srgbClr val="ffffff"/>
+                </a:solidFill>
+                <a:latin typeface="Arial"/>
+              </a:rPr>
+              <a:t>T42 Data Conclusions</a:t>
+            </a:r>
+            <a:endParaRPr b="0" lang="en-US" sz="3300" spc="-1" strike="noStrike">
               <a:latin typeface="Arial"/>
             </a:endParaRPr>
           </a:p>
@@ -15432,7 +16457,7 @@
         <p:spPr>
           <a:xfrm>
             <a:off x="360000" y="1080000"/>
-            <a:ext cx="3525840" cy="3034440"/>
+            <a:ext cx="9359280" cy="3599280"/>
           </a:xfrm>
           <a:prstGeom prst="rect">
             <a:avLst/>
@@ -15444,7 +16469,7 @@
         </p:spPr>
         <p:txBody>
           <a:bodyPr lIns="0" rIns="0" tIns="0" bIns="0" anchor="t">
-            <a:normAutofit fontScale="68000"/>
+            <a:noAutofit/>
           </a:bodyPr>
           <a:p>
             <a:pPr marL="432000" indent="-324000">
@@ -15452,22 +16477,34 @@
                 <a:spcPct val="100000"/>
               </a:lnSpc>
               <a:spcBef>
-                <a:spcPts val="1417"/>
+                <a:spcPts val="1060"/>
               </a:spcBef>
               <a:buClr>
-                <a:srgbClr val="000000"/>
+                <a:srgbClr val="77caee"/>
               </a:buClr>
               <a:buSzPct val="45000"/>
               <a:buFont typeface="Wingdings" charset="2"/>
               <a:buChar char=""/>
             </a:pPr>
             <a:r>
-              <a:rPr b="0" lang="en-US" sz="2000" spc="-1" strike="noStrike">
-                <a:latin typeface="Arial"/>
-              </a:rPr>
-              <a:t>Average Wait times for people waiting in Juarez after filing CBP Request (during T42 Exceptions) and also after G28 letter of representation</a:t>
-            </a:r>
-            <a:endParaRPr b="0" lang="en-US" sz="2000" spc="-1" strike="noStrike">
+              <a:rPr b="0" lang="en-US" sz="2400" spc="-1" strike="noStrike">
+                <a:solidFill>
+                  <a:srgbClr val="009bdd"/>
+                </a:solidFill>
+                <a:latin typeface="Arial"/>
+              </a:rPr>
+              <a:t>Average Number of Days traveling through Mexico – 77 Days      </a:t>
+            </a:r>
+            <a:r>
+              <a:rPr b="0" lang="en-US" sz="1000" spc="-1" strike="noStrike">
+                <a:solidFill>
+                  <a:srgbClr val="009bdd"/>
+                </a:solidFill>
+                <a:latin typeface="Arial"/>
+              </a:rPr>
+              <a:t>(T42 Screening Data Airtables)</a:t>
+            </a:r>
+            <a:endParaRPr b="0" lang="en-US" sz="1000" spc="-1" strike="noStrike">
               <a:latin typeface="Arial"/>
             </a:endParaRPr>
           </a:p>
@@ -15487,80 +16524,74 @@
               <a:buChar char=""/>
             </a:pPr>
             <a:r>
-              <a:rPr b="0" lang="en-US" sz="2000" spc="-1" strike="noStrike">
-                <a:latin typeface="Arial"/>
-              </a:rPr>
-              <a:t>Being forced to stay in Juarez on streets, or without job, income for almost a month (average) could be very dangerous and bad for human rights</a:t>
-            </a:r>
-            <a:endParaRPr b="0" lang="en-US" sz="2000" spc="-1" strike="noStrike">
-              <a:latin typeface="Arial"/>
-            </a:endParaRPr>
-          </a:p>
-          <a:p>
-            <a:pPr lvl="2" marL="1296000" indent="-288000">
+              <a:rPr b="0" lang="en-US" sz="1500" spc="-1" strike="noStrike">
+                <a:solidFill>
+                  <a:srgbClr val="009bdd"/>
+                </a:solidFill>
+                <a:latin typeface="Arial"/>
+              </a:rPr>
+              <a:t>“</a:t>
+            </a:r>
+            <a:r>
+              <a:rPr b="0" lang="en-US" sz="1500" spc="-1" strike="noStrike">
+                <a:solidFill>
+                  <a:srgbClr val="009bdd"/>
+                </a:solidFill>
+                <a:latin typeface="Arial"/>
+              </a:rPr>
+              <a:t>Mexico is dangerous for migrants” - </a:t>
+            </a:r>
+            <a:r>
+              <a:rPr b="1" lang="en-US" sz="1500" spc="-1" strike="noStrike">
+                <a:solidFill>
+                  <a:srgbClr val="009bdd"/>
+                </a:solidFill>
+                <a:latin typeface="Arial"/>
+              </a:rPr>
+              <a:t>72%</a:t>
+            </a:r>
+            <a:r>
+              <a:rPr b="0" lang="en-US" sz="1500" spc="-1" strike="noStrike">
+                <a:solidFill>
+                  <a:srgbClr val="009bdd"/>
+                </a:solidFill>
+                <a:latin typeface="Arial"/>
+              </a:rPr>
+              <a:t> </a:t>
+            </a:r>
+            <a:r>
+              <a:rPr b="0" lang="en-US" sz="1000" spc="-1" strike="noStrike">
+                <a:solidFill>
+                  <a:srgbClr val="009bdd"/>
+                </a:solidFill>
+                <a:latin typeface="Arial"/>
+              </a:rPr>
+              <a:t>(LAMX Front Desk Data)</a:t>
+            </a:r>
+            <a:r>
+              <a:rPr b="0" lang="en-US" sz="1500" spc="-1" strike="noStrike">
+                <a:solidFill>
+                  <a:srgbClr val="009bdd"/>
+                </a:solidFill>
+                <a:latin typeface="Arial"/>
+              </a:rPr>
+              <a:t> report suffering some form of violence (kidnapping, robbing, death threats, GBV…) forcing them to stay there during T42 was danger to human rights.</a:t>
+            </a:r>
+            <a:endParaRPr b="0" lang="en-US" sz="1500" spc="-1" strike="noStrike">
+              <a:latin typeface="Arial"/>
+            </a:endParaRPr>
+          </a:p>
+          <a:p>
+            <a:pPr>
               <a:lnSpc>
                 <a:spcPct val="100000"/>
               </a:lnSpc>
               <a:spcBef>
-                <a:spcPts val="850"/>
+                <a:spcPts val="1417"/>
               </a:spcBef>
-              <a:buClr>
-                <a:srgbClr val="000000"/>
-              </a:buClr>
-              <a:buSzPct val="45000"/>
-              <a:buFont typeface="Wingdings" charset="2"/>
-              <a:buChar char=""/>
-            </a:pPr>
-            <a:r>
-              <a:rPr b="0" lang="en-US" sz="2000" spc="-1" strike="noStrike">
-                <a:latin typeface="Arial"/>
-              </a:rPr>
-              <a:t>Longest wait time – </a:t>
-            </a:r>
-            <a:r>
-              <a:rPr b="1" lang="en-US" sz="2000" spc="-1" strike="noStrike">
-                <a:latin typeface="Arial"/>
-              </a:rPr>
-              <a:t>134 days</a:t>
-            </a:r>
-            <a:r>
-              <a:rPr b="0" lang="en-US" sz="2000" spc="-1" strike="noStrike">
-                <a:latin typeface="Arial"/>
-              </a:rPr>
-              <a:t> between G28 and Present at POE</a:t>
-            </a:r>
-            <a:endParaRPr b="0" lang="en-US" sz="2000" spc="-1" strike="noStrike">
-              <a:latin typeface="Arial"/>
-            </a:endParaRPr>
-          </a:p>
-          <a:p>
-            <a:pPr lvl="2" marL="1296000" indent="-288000">
-              <a:lnSpc>
-                <a:spcPct val="100000"/>
-              </a:lnSpc>
-              <a:spcBef>
-                <a:spcPts val="850"/>
-              </a:spcBef>
-              <a:buClr>
-                <a:srgbClr val="000000"/>
-              </a:buClr>
-              <a:buSzPct val="45000"/>
-              <a:buFont typeface="Wingdings" charset="2"/>
-              <a:buChar char=""/>
-            </a:pPr>
-            <a:r>
-              <a:rPr b="0" lang="en-US" sz="2000" spc="-1" strike="noStrike">
-                <a:latin typeface="Arial"/>
-              </a:rPr>
-              <a:t>Longest between CBP Request and Present at POE – </a:t>
-            </a:r>
-            <a:r>
-              <a:rPr b="1" lang="en-US" sz="2000" spc="-1" strike="noStrike">
-                <a:latin typeface="Arial"/>
-              </a:rPr>
-              <a:t>34 days</a:t>
-            </a:r>
-            <a:endParaRPr b="0" lang="en-US" sz="2000" spc="-1" strike="noStrike">
+              <a:buNone/>
+            </a:pPr>
+            <a:endParaRPr b="0" lang="en-US" sz="2800" spc="-1" strike="noStrike">
               <a:latin typeface="Arial"/>
             </a:endParaRPr>
           </a:p>
@@ -15578,8 +16609,8 @@
         </p:blipFill>
         <p:spPr>
           <a:xfrm>
-            <a:off x="4114800" y="731520"/>
-            <a:ext cx="5982480" cy="3425040"/>
+            <a:off x="2117880" y="2286000"/>
+            <a:ext cx="4511160" cy="2742840"/>
           </a:xfrm>
           <a:prstGeom prst="rect">
             <a:avLst/>
@@ -15596,14 +16627,14 @@
             <a:spLocks noGrp="1"/>
           </p:cNvSpPr>
           <p:nvPr>
-            <p:ph type="sldNum" idx="8"/>
+            <p:ph type="sldNum" idx="5"/>
           </p:nvPr>
         </p:nvSpPr>
         <p:spPr/>
         <p:txBody>
           <a:bodyPr/>
           <a:p>
-            <a:fld id="{F31767E5-E5FC-40C1-8335-1546FA8F0396}" type="slidenum">
+            <a:fld id="{6F3E172F-ADA1-4F98-8C2A-13362C38E113}" type="slidenum">
               <a:t>6</a:t>
             </a:fld>
           </a:p>
@@ -15616,14 +16647,14 @@
             <a:spLocks noGrp="1"/>
           </p:cNvSpPr>
           <p:nvPr>
-            <p:ph type="dt" idx="9"/>
+            <p:ph type="dt" idx="6"/>
           </p:nvPr>
         </p:nvSpPr>
         <p:spPr/>
         <p:txBody>
           <a:bodyPr/>
           <a:p>
-            <a:fld id="{B87E6C2C-B53B-486F-A160-EFFA9DAFB83B}" type="datetime1">
+            <a:fld id="{0C382958-D032-478C-A3FD-AD5CAA032C32}" type="datetime1">
               <a:rPr lang="en-US"/>
               <a:t>03/26/2024</a:t>
             </a:fld>
@@ -15698,7 +16729,7 @@
               <a:rPr b="0" lang="en-US" sz="4400" spc="-1" strike="noStrike">
                 <a:latin typeface="Arial"/>
               </a:rPr>
-              <a:t>T42 CBP Wait time</a:t>
+              <a:t>T42 CBP Wait Time</a:t>
             </a:r>
             <a:endParaRPr b="0" lang="en-US" sz="4400" spc="-1" strike="noStrike">
               <a:latin typeface="Arial"/>
@@ -15719,7 +16750,7 @@
         <p:spPr>
           <a:xfrm>
             <a:off x="360000" y="1080000"/>
-            <a:ext cx="3297240" cy="3263040"/>
+            <a:ext cx="3525840" cy="3034440"/>
           </a:xfrm>
           <a:prstGeom prst="rect">
             <a:avLst/>
@@ -15731,7 +16762,7 @@
         </p:spPr>
         <p:txBody>
           <a:bodyPr lIns="0" rIns="0" tIns="0" bIns="0" anchor="t">
-            <a:normAutofit/>
+            <a:normAutofit fontScale="68000"/>
           </a:bodyPr>
           <a:p>
             <a:pPr marL="432000" indent="-324000">
@@ -15749,12 +16780,36 @@
               <a:buChar char=""/>
             </a:pPr>
             <a:r>
-              <a:rPr b="0" lang="en-US" sz="1800" spc="-1" strike="noStrike">
-                <a:latin typeface="Arial"/>
-              </a:rPr>
-              <a:t>These wait times often led people to be desperate – many  attempts at crossing not through the port of entry.</a:t>
-            </a:r>
-            <a:endParaRPr b="0" lang="en-US" sz="1800" spc="-1" strike="noStrike">
+              <a:rPr b="0" lang="en-US" sz="2000" spc="-1" strike="noStrike">
+                <a:latin typeface="Arial"/>
+              </a:rPr>
+              <a:t>Average Wait times for people </a:t>
+            </a:r>
+            <a:r>
+              <a:rPr b="0" lang="en-US" sz="2000" spc="-1" strike="noStrike">
+                <a:latin typeface="Arial"/>
+              </a:rPr>
+              <a:t>waiting in Juarez after filing CBP </a:t>
+            </a:r>
+            <a:r>
+              <a:rPr b="0" lang="en-US" sz="2000" spc="-1" strike="noStrike">
+                <a:latin typeface="Arial"/>
+              </a:rPr>
+              <a:t>Request (during T42 Exceptions) </a:t>
+            </a:r>
+            <a:r>
+              <a:rPr b="0" lang="en-US" sz="2000" spc="-1" strike="noStrike">
+                <a:latin typeface="Arial"/>
+              </a:rPr>
+              <a:t>and also after G28 letter of </a:t>
+            </a:r>
+            <a:r>
+              <a:rPr b="0" lang="en-US" sz="2000" spc="-1" strike="noStrike">
+                <a:latin typeface="Arial"/>
+              </a:rPr>
+              <a:t>representation</a:t>
+            </a:r>
+            <a:endParaRPr b="0" lang="en-US" sz="2000" spc="-1" strike="noStrike">
               <a:latin typeface="Arial"/>
             </a:endParaRPr>
           </a:p>
@@ -15774,63 +16829,134 @@
               <a:buChar char=""/>
             </a:pPr>
             <a:r>
-              <a:rPr b="0" lang="en-US" sz="1500" spc="-1" strike="noStrike">
-                <a:latin typeface="Arial"/>
-              </a:rPr>
-              <a:t>With 102 parties being removed 3+ times </a:t>
-            </a:r>
-            <a:r>
-              <a:rPr b="1" lang="en-US" sz="1500" spc="-1" strike="noStrike">
-                <a:latin typeface="Arial"/>
-              </a:rPr>
-              <a:t>(9%)</a:t>
-            </a:r>
-            <a:endParaRPr b="0" lang="en-US" sz="1500" spc="-1" strike="noStrike">
-              <a:latin typeface="Arial"/>
-            </a:endParaRPr>
-          </a:p>
-          <a:p>
-            <a:pPr lvl="1" marL="864000" indent="-324000">
+              <a:rPr b="0" lang="en-US" sz="2000" spc="-1" strike="noStrike">
+                <a:latin typeface="Arial"/>
+              </a:rPr>
+              <a:t>Being forced to stay in Juarez </a:t>
+            </a:r>
+            <a:r>
+              <a:rPr b="0" lang="en-US" sz="2000" spc="-1" strike="noStrike">
+                <a:latin typeface="Arial"/>
+              </a:rPr>
+              <a:t>on streets, or without job, </a:t>
+            </a:r>
+            <a:r>
+              <a:rPr b="0" lang="en-US" sz="2000" spc="-1" strike="noStrike">
+                <a:latin typeface="Arial"/>
+              </a:rPr>
+              <a:t>income for almost a month </a:t>
+            </a:r>
+            <a:r>
+              <a:rPr b="0" lang="en-US" sz="2000" spc="-1" strike="noStrike">
+                <a:latin typeface="Arial"/>
+              </a:rPr>
+              <a:t>(average) could be very </a:t>
+            </a:r>
+            <a:r>
+              <a:rPr b="0" lang="en-US" sz="2000" spc="-1" strike="noStrike">
+                <a:latin typeface="Arial"/>
+              </a:rPr>
+              <a:t>dangerous and bad for human </a:t>
+            </a:r>
+            <a:r>
+              <a:rPr b="0" lang="en-US" sz="2000" spc="-1" strike="noStrike">
+                <a:latin typeface="Arial"/>
+              </a:rPr>
+              <a:t>rights</a:t>
+            </a:r>
+            <a:endParaRPr b="0" lang="en-US" sz="2000" spc="-1" strike="noStrike">
+              <a:latin typeface="Arial"/>
+            </a:endParaRPr>
+          </a:p>
+          <a:p>
+            <a:pPr lvl="2" marL="1296000" indent="-288000">
               <a:lnSpc>
                 <a:spcPct val="100000"/>
               </a:lnSpc>
               <a:spcBef>
-                <a:spcPts val="1134"/>
+                <a:spcPts val="850"/>
               </a:spcBef>
               <a:buClr>
                 <a:srgbClr val="000000"/>
               </a:buClr>
-              <a:buSzPct val="75000"/>
-              <a:buFont typeface="Symbol"/>
-              <a:buChar char=""/>
-            </a:pPr>
-            <a:r>
-              <a:rPr b="1" lang="en-US" sz="1500" spc="-1" strike="noStrike">
-                <a:latin typeface="Arial"/>
-              </a:rPr>
-              <a:t>0.68%</a:t>
-            </a:r>
-            <a:r>
-              <a:rPr b="0" lang="en-US" sz="1500" spc="-1" strike="noStrike">
-                <a:latin typeface="Arial"/>
-              </a:rPr>
-              <a:t> being removed at least once (744 parties)</a:t>
-            </a:r>
-            <a:endParaRPr b="0" lang="en-US" sz="1500" spc="-1" strike="noStrike">
-              <a:latin typeface="Arial"/>
-            </a:endParaRPr>
-          </a:p>
-          <a:p>
-            <a:pPr>
+              <a:buSzPct val="45000"/>
+              <a:buFont typeface="Wingdings" charset="2"/>
+              <a:buChar char=""/>
+            </a:pPr>
+            <a:r>
+              <a:rPr b="0" lang="en-US" sz="2000" spc="-1" strike="noStrike">
+                <a:latin typeface="Arial"/>
+              </a:rPr>
+              <a:t>Longest wait time – </a:t>
+            </a:r>
+            <a:r>
+              <a:rPr b="1" lang="en-US" sz="2000" spc="-1" strike="noStrike">
+                <a:latin typeface="Arial"/>
+              </a:rPr>
+              <a:t>134 </a:t>
+            </a:r>
+            <a:r>
+              <a:rPr b="1" lang="en-US" sz="2000" spc="-1" strike="noStrike">
+                <a:latin typeface="Arial"/>
+              </a:rPr>
+              <a:t>days</a:t>
+            </a:r>
+            <a:r>
+              <a:rPr b="0" lang="en-US" sz="2000" spc="-1" strike="noStrike">
+                <a:latin typeface="Arial"/>
+              </a:rPr>
+              <a:t> between G28 and </a:t>
+            </a:r>
+            <a:r>
+              <a:rPr b="0" lang="en-US" sz="2000" spc="-1" strike="noStrike">
+                <a:latin typeface="Arial"/>
+              </a:rPr>
+              <a:t>Present at POE</a:t>
+            </a:r>
+            <a:endParaRPr b="0" lang="en-US" sz="2000" spc="-1" strike="noStrike">
+              <a:latin typeface="Arial"/>
+            </a:endParaRPr>
+          </a:p>
+          <a:p>
+            <a:pPr lvl="2" marL="1296000" indent="-288000">
               <a:lnSpc>
                 <a:spcPct val="100000"/>
               </a:lnSpc>
               <a:spcBef>
-                <a:spcPts val="1417"/>
+                <a:spcPts val="850"/>
               </a:spcBef>
-              <a:buNone/>
-            </a:pPr>
-            <a:endParaRPr b="0" lang="en-US" sz="2800" spc="-1" strike="noStrike">
+              <a:buClr>
+                <a:srgbClr val="000000"/>
+              </a:buClr>
+              <a:buSzPct val="45000"/>
+              <a:buFont typeface="Wingdings" charset="2"/>
+              <a:buChar char=""/>
+            </a:pPr>
+            <a:r>
+              <a:rPr b="0" lang="en-US" sz="2000" spc="-1" strike="noStrike">
+                <a:latin typeface="Arial"/>
+              </a:rPr>
+              <a:t>Longest between CBP </a:t>
+            </a:r>
+            <a:r>
+              <a:rPr b="0" lang="en-US" sz="2000" spc="-1" strike="noStrike">
+                <a:latin typeface="Arial"/>
+              </a:rPr>
+              <a:t>Request and Present at </a:t>
+            </a:r>
+            <a:r>
+              <a:rPr b="0" lang="en-US" sz="2000" spc="-1" strike="noStrike">
+                <a:latin typeface="Arial"/>
+              </a:rPr>
+              <a:t>POE – </a:t>
+            </a:r>
+            <a:r>
+              <a:rPr b="1" lang="en-US" sz="2000" spc="-1" strike="noStrike">
+                <a:latin typeface="Arial"/>
+              </a:rPr>
+              <a:t>34 days</a:t>
+            </a:r>
+            <a:endParaRPr b="0" lang="en-US" sz="2000" spc="-1" strike="noStrike">
               <a:latin typeface="Arial"/>
             </a:endParaRPr>
           </a:p>
@@ -15848,8 +16974,8 @@
         </p:blipFill>
         <p:spPr>
           <a:xfrm>
-            <a:off x="3657600" y="731520"/>
-            <a:ext cx="6411960" cy="3840120"/>
+            <a:off x="4114800" y="731520"/>
+            <a:ext cx="5982480" cy="3425040"/>
           </a:xfrm>
           <a:prstGeom prst="rect">
             <a:avLst/>
@@ -15873,7 +16999,7 @@
         <p:txBody>
           <a:bodyPr/>
           <a:p>
-            <a:fld id="{93B2690F-7E50-4B47-8958-EBC7764D6D50}" type="slidenum">
+            <a:fld id="{51DC49CB-8FAB-434B-AA7D-3E73BE88FC16}" type="slidenum">
               <a:t>7</a:t>
             </a:fld>
           </a:p>
@@ -15893,7 +17019,7 @@
         <p:txBody>
           <a:bodyPr/>
           <a:p>
-            <a:fld id="{2C47A575-9F0F-4D7E-9F64-262A81236D7C}" type="datetime1">
+            <a:fld id="{0C13DBAC-C204-4E62-ADB8-96FB42CA9F29}" type="datetime1">
               <a:rPr lang="en-US"/>
               <a:t>03/26/2024</a:t>
             </a:fld>
@@ -15968,7 +17094,7 @@
               <a:rPr b="0" lang="en-US" sz="4400" spc="-1" strike="noStrike">
                 <a:latin typeface="Arial"/>
               </a:rPr>
-              <a:t>T42 - Language</a:t>
+              <a:t>T42 CBP Wait time</a:t>
             </a:r>
             <a:endParaRPr b="0" lang="en-US" sz="4400" spc="-1" strike="noStrike">
               <a:latin typeface="Arial"/>
@@ -15989,7 +17115,7 @@
         <p:spPr>
           <a:xfrm>
             <a:off x="360000" y="1080000"/>
-            <a:ext cx="4566960" cy="2805840"/>
+            <a:ext cx="3297240" cy="3263040"/>
           </a:xfrm>
           <a:prstGeom prst="rect">
             <a:avLst/>
@@ -16003,6 +17129,31 @@
           <a:bodyPr lIns="0" rIns="0" tIns="0" bIns="0" anchor="t">
             <a:normAutofit/>
           </a:bodyPr>
+          <a:p>
+            <a:pPr marL="432000" indent="-324000">
+              <a:lnSpc>
+                <a:spcPct val="100000"/>
+              </a:lnSpc>
+              <a:spcBef>
+                <a:spcPts val="1417"/>
+              </a:spcBef>
+              <a:buClr>
+                <a:srgbClr val="000000"/>
+              </a:buClr>
+              <a:buSzPct val="45000"/>
+              <a:buFont typeface="Wingdings" charset="2"/>
+              <a:buChar char=""/>
+            </a:pPr>
+            <a:r>
+              <a:rPr b="0" lang="en-US" sz="1800" spc="-1" strike="noStrike">
+                <a:latin typeface="Arial"/>
+              </a:rPr>
+              <a:t>These wait times often led people to be desperate – many  attempts at crossing not through the port of entry.</a:t>
+            </a:r>
+            <a:endParaRPr b="0" lang="en-US" sz="1800" spc="-1" strike="noStrike">
+              <a:latin typeface="Arial"/>
+            </a:endParaRPr>
+          </a:p>
           <a:p>
             <a:pPr lvl="1" marL="864000" indent="-324000">
               <a:lnSpc>
@@ -16020,43 +17171,46 @@
             </a:pPr>
             <a:r>
               <a:rPr b="0" lang="en-US" sz="1500" spc="-1" strike="noStrike">
-                <a:solidFill>
-                  <a:srgbClr val="009bdd"/>
-                </a:solidFill>
-                <a:latin typeface="Arial"/>
-                <a:ea typeface="Noto Sans CJK SC"/>
-              </a:rPr>
-              <a:t>Especially vulnerable are those who speak indigenous language – 1/25 parties (Kechi, Mixteco…) </a:t>
-            </a:r>
-            <a:r>
-              <a:rPr b="0" lang="en-US" sz="1000" spc="-1" strike="noStrike">
-                <a:solidFill>
-                  <a:srgbClr val="009bdd"/>
-                </a:solidFill>
-                <a:latin typeface="Arial"/>
-                <a:ea typeface="Noto Sans CJK SC"/>
-              </a:rPr>
-              <a:t>(From T42 Screening Airtables)</a:t>
+                <a:latin typeface="Arial"/>
+              </a:rPr>
+              <a:t>With 102 parties being removed 3+ times </a:t>
+            </a:r>
+            <a:r>
+              <a:rPr b="1" lang="en-US" sz="1500" spc="-1" strike="noStrike">
+                <a:latin typeface="Arial"/>
+              </a:rPr>
+              <a:t>(9%)</a:t>
+            </a:r>
+            <a:endParaRPr b="0" lang="en-US" sz="1500" spc="-1" strike="noStrike">
+              <a:latin typeface="Arial"/>
+            </a:endParaRPr>
+          </a:p>
+          <a:p>
+            <a:pPr lvl="1" marL="864000" indent="-324000">
+              <a:lnSpc>
+                <a:spcPct val="100000"/>
+              </a:lnSpc>
+              <a:spcBef>
+                <a:spcPts val="1134"/>
+              </a:spcBef>
+              <a:buClr>
+                <a:srgbClr val="000000"/>
+              </a:buClr>
+              <a:buSzPct val="75000"/>
+              <a:buFont typeface="Symbol"/>
+              <a:buChar char=""/>
+            </a:pPr>
+            <a:r>
+              <a:rPr b="1" lang="en-US" sz="1500" spc="-1" strike="noStrike">
+                <a:latin typeface="Arial"/>
+              </a:rPr>
+              <a:t>68%</a:t>
             </a:r>
             <a:r>
               <a:rPr b="0" lang="en-US" sz="1500" spc="-1" strike="noStrike">
-                <a:solidFill>
-                  <a:srgbClr val="009bdd"/>
-                </a:solidFill>
-                <a:latin typeface="Arial"/>
-                <a:ea typeface="Noto Sans CJK SC"/>
-              </a:rPr>
-              <a:t>, routinely taken advantage of </a:t>
-            </a:r>
-            <a:r>
-              <a:rPr b="1" lang="en-US" sz="1500" spc="-1" strike="noStrike">
-                <a:solidFill>
-                  <a:srgbClr val="009bdd"/>
-                </a:solidFill>
-                <a:latin typeface="Arial"/>
-                <a:ea typeface="Noto Sans CJK SC"/>
-              </a:rPr>
-              <a:t>( add some personal story here and data about if they suffer more…) </a:t>
+                <a:latin typeface="Arial"/>
+              </a:rPr>
+              <a:t> being removed at least once (744 parties)</a:t>
             </a:r>
             <a:endParaRPr b="0" lang="en-US" sz="1500" spc="-1" strike="noStrike">
               <a:latin typeface="Arial"/>
@@ -16090,8 +17244,8 @@
         </p:blipFill>
         <p:spPr>
           <a:xfrm>
-            <a:off x="5257800" y="712080"/>
-            <a:ext cx="3530520" cy="4088160"/>
+            <a:off x="3657600" y="731520"/>
+            <a:ext cx="6411960" cy="3840120"/>
           </a:xfrm>
           <a:prstGeom prst="rect">
             <a:avLst/>
@@ -16108,14 +17262,14 @@
             <a:spLocks noGrp="1"/>
           </p:cNvSpPr>
           <p:nvPr>
-            <p:ph type="sldNum" idx="11"/>
+            <p:ph type="sldNum" idx="8"/>
           </p:nvPr>
         </p:nvSpPr>
         <p:spPr/>
         <p:txBody>
           <a:bodyPr/>
           <a:p>
-            <a:fld id="{AFA09B45-74B2-409B-A786-9CF2F1CECBF2}" type="slidenum">
+            <a:fld id="{F25A2935-F511-4BB5-9236-013D23010CD1}" type="slidenum">
               <a:t>8</a:t>
             </a:fld>
           </a:p>
@@ -16128,14 +17282,14 @@
             <a:spLocks noGrp="1"/>
           </p:cNvSpPr>
           <p:nvPr>
-            <p:ph type="dt" idx="12"/>
+            <p:ph type="dt" idx="9"/>
           </p:nvPr>
         </p:nvSpPr>
         <p:spPr/>
         <p:txBody>
           <a:bodyPr/>
           <a:p>
-            <a:fld id="{653111D5-971B-4E32-8022-2988B2621467}" type="datetime1">
+            <a:fld id="{87B4CE20-2DE4-4CF9-ABDD-9C50A547C1DE}" type="datetime1">
               <a:rPr lang="en-US"/>
               <a:t>03/26/2024</a:t>
             </a:fld>
@@ -16185,7 +17339,7 @@
         <p:spPr>
           <a:xfrm>
             <a:off x="360000" y="106200"/>
-            <a:ext cx="9359280" cy="624960"/>
+            <a:ext cx="9359280" cy="625320"/>
           </a:xfrm>
           <a:prstGeom prst="rect">
             <a:avLst/>
@@ -16201,16 +17355,13 @@
           </a:bodyPr>
           <a:p>
             <a:pPr algn="ctr">
-              <a:lnSpc>
-                <a:spcPct val="100000"/>
-              </a:lnSpc>
               <a:buNone/>
             </a:pPr>
             <a:r>
               <a:rPr b="0" lang="en-US" sz="4400" spc="-1" strike="noStrike">
                 <a:latin typeface="Arial"/>
               </a:rPr>
-              <a:t>LGBTQ+ Observations</a:t>
+              <a:t>T42 LGBTQ+ Violence</a:t>
             </a:r>
             <a:endParaRPr b="0" lang="en-US" sz="4400" spc="-1" strike="noStrike">
               <a:latin typeface="Arial"/>
@@ -16218,32 +17369,9 @@
           </a:p>
         </p:txBody>
       </p:sp>
-      <p:pic>
-        <p:nvPicPr>
-          <p:cNvPr id="243" name="" descr=""/>
-          <p:cNvPicPr/>
-          <p:nvPr/>
-        </p:nvPicPr>
-        <p:blipFill>
-          <a:blip r:embed="rId1"/>
-          <a:stretch/>
-        </p:blipFill>
-        <p:spPr>
-          <a:xfrm>
-            <a:off x="3200400" y="1371600"/>
-            <a:ext cx="6857640" cy="3668400"/>
-          </a:xfrm>
-          <a:prstGeom prst="rect">
-            <a:avLst/>
-          </a:prstGeom>
-          <a:ln w="0">
-            <a:noFill/>
-          </a:ln>
-        </p:spPr>
-      </p:pic>
-      <p:sp>
-        <p:nvSpPr>
-          <p:cNvPr id="244" name="PlaceHolder 2"/>
+      <p:sp>
+        <p:nvSpPr>
+          <p:cNvPr id="243" name="PlaceHolder 2"/>
           <p:cNvSpPr>
             <a:spLocks noGrp="1"/>
           </p:cNvSpPr>
@@ -16253,8 +17381,8 @@
         </p:nvSpPr>
         <p:spPr>
           <a:xfrm>
-            <a:off x="360000" y="914400"/>
-            <a:ext cx="2840040" cy="1716480"/>
+            <a:off x="360000" y="1080000"/>
+            <a:ext cx="2228400" cy="1716480"/>
           </a:xfrm>
           <a:prstGeom prst="rect">
             <a:avLst/>
@@ -16266,7 +17394,7 @@
         </p:spPr>
         <p:txBody>
           <a:bodyPr lIns="0" rIns="0" tIns="0" bIns="0" anchor="t">
-            <a:normAutofit fontScale="78000"/>
+            <a:normAutofit fontScale="76000"/>
           </a:bodyPr>
           <a:p>
             <a:pPr marL="432000" indent="-324000">
@@ -16284,35 +17412,16 @@
               <a:buChar char=""/>
             </a:pPr>
             <a:r>
-              <a:rPr b="1" lang="en-US" sz="1500" spc="-1" strike="noStrike">
-                <a:latin typeface="Arial"/>
-              </a:rPr>
-              <a:t>15% of all immigrant parties cite LGBTQ+ reasons for emigrating</a:t>
-            </a:r>
-            <a:endParaRPr b="0" lang="en-US" sz="1500" spc="-1" strike="noStrike">
-              <a:latin typeface="Arial"/>
-            </a:endParaRPr>
-          </a:p>
-          <a:p>
-            <a:pPr marL="432000" indent="-324000">
-              <a:lnSpc>
-                <a:spcPct val="100000"/>
-              </a:lnSpc>
-              <a:spcBef>
-                <a:spcPts val="1417"/>
-              </a:spcBef>
-              <a:buClr>
-                <a:srgbClr val="000000"/>
-              </a:buClr>
-              <a:buSzPct val="45000"/>
-              <a:buFont typeface="Wingdings" charset="2"/>
-              <a:buChar char=""/>
-            </a:pPr>
-            <a:r>
               <a:rPr b="0" lang="en-US" sz="1500" spc="-1" strike="noStrike">
                 <a:latin typeface="Arial"/>
               </a:rPr>
-              <a:t>Countries such as Nicaragua which rank low on friendliness for LGBTQ+ people have high percentage of LGBTQ+ migrants – </a:t>
+              <a:t> </a:t>
+            </a:r>
+            <a:r>
+              <a:rPr b="0" lang="en-US" sz="1500" spc="-1" strike="noStrike">
+                <a:latin typeface="Arial"/>
+              </a:rPr>
+              <a:t>LGBTQ+ people suffered violence in Mexico at a significantly higher level!!! </a:t>
             </a:r>
             <a:endParaRPr b="0" lang="en-US" sz="1500" spc="-1" strike="noStrike">
               <a:latin typeface="Arial"/>
@@ -16330,21 +17439,81 @@
                 <a:srgbClr val="000000"/>
               </a:buClr>
               <a:buSzPct val="75000"/>
-              <a:buFont typeface="Symbol"/>
+              <a:buFont typeface="Symbol" charset="2"/>
               <a:buChar char=""/>
             </a:pPr>
             <a:r>
               <a:rPr b="0" lang="en-US" sz="1500" spc="-1" strike="noStrike">
                 <a:latin typeface="Arial"/>
               </a:rPr>
-              <a:t>Subject to a lot of discrimination and crime for sexuality/gender</a:t>
+              <a:t>percentage of violence against </a:t>
+            </a:r>
+            <a:r>
+              <a:rPr b="1" lang="en-US" sz="1500" spc="-1" strike="noStrike">
+                <a:latin typeface="Arial"/>
+              </a:rPr>
+              <a:t>non-LGBTQ+ parties - 67.48%</a:t>
             </a:r>
             <a:endParaRPr b="0" lang="en-US" sz="1500" spc="-1" strike="noStrike">
               <a:latin typeface="Arial"/>
             </a:endParaRPr>
           </a:p>
-        </p:txBody>
-      </p:sp>
+          <a:p>
+            <a:pPr lvl="1" marL="864000" indent="-324000">
+              <a:lnSpc>
+                <a:spcPct val="100000"/>
+              </a:lnSpc>
+              <a:spcBef>
+                <a:spcPts val="1134"/>
+              </a:spcBef>
+              <a:buClr>
+                <a:srgbClr val="000000"/>
+              </a:buClr>
+              <a:buSzPct val="75000"/>
+              <a:buFont typeface="Symbol" charset="2"/>
+              <a:buChar char=""/>
+            </a:pPr>
+            <a:r>
+              <a:rPr b="0" lang="en-US" sz="1500" spc="-1" strike="noStrike">
+                <a:latin typeface="Arial"/>
+              </a:rPr>
+              <a:t>percentage of violence against </a:t>
+            </a:r>
+            <a:r>
+              <a:rPr b="1" lang="en-US" sz="1500" spc="-1" strike="noStrike">
+                <a:latin typeface="Arial"/>
+              </a:rPr>
+              <a:t>LGBTQ+ parties - 94.40%</a:t>
+            </a:r>
+            <a:endParaRPr b="0" lang="en-US" sz="1500" spc="-1" strike="noStrike">
+              <a:latin typeface="Arial"/>
+            </a:endParaRPr>
+          </a:p>
+        </p:txBody>
+      </p:sp>
+      <p:pic>
+        <p:nvPicPr>
+          <p:cNvPr id="244" name="" descr=""/>
+          <p:cNvPicPr/>
+          <p:nvPr/>
+        </p:nvPicPr>
+        <p:blipFill>
+          <a:blip r:embed="rId1"/>
+          <a:stretch/>
+        </p:blipFill>
+        <p:spPr>
+          <a:xfrm>
+            <a:off x="3259080" y="914400"/>
+            <a:ext cx="6821640" cy="3657600"/>
+          </a:xfrm>
+          <a:prstGeom prst="rect">
+            <a:avLst/>
+          </a:prstGeom>
+          <a:ln w="0">
+            <a:noFill/>
+          </a:ln>
+        </p:spPr>
+      </p:pic>
       <p:sp>
         <p:nvSpPr>
           <p:cNvPr id="4" name="PlaceHolder 3"/>
@@ -16359,7 +17528,7 @@
         <p:txBody>
           <a:bodyPr/>
           <a:p>
-            <a:fld id="{EF4A1529-ED9C-4BDE-B8C0-AED8D70A866D}" type="slidenum">
+            <a:fld id="{E079A725-FFFD-430C-9333-1F23A2E8D98A}" type="slidenum">
               <a:t>9</a:t>
             </a:fld>
           </a:p>
@@ -16379,7 +17548,7 @@
         <p:txBody>
           <a:bodyPr/>
           <a:p>
-            <a:fld id="{8C80181D-1897-4421-A4E2-E279266293C0}" type="datetime1">
+            <a:fld id="{257CDF84-CA2B-47B3-8EEA-E5AF12211428}" type="datetime1">
               <a:rPr lang="en-US"/>
               <a:t>03/26/2024</a:t>
             </a:fld>

</xml_diff>